<commit_message>
Update notes and diagram
</commit_message>
<xml_diff>
--- a/docs/Презентация.pptx
+++ b/docs/Презентация.pptx
@@ -5,7 +5,7 @@
     <p:sldMasterId id="2147483648" r:id="rId1"/>
   </p:sldMasterIdLst>
   <p:notesMasterIdLst>
-    <p:notesMasterId r:id="rId7"/>
+    <p:notesMasterId r:id="rId9"/>
   </p:notesMasterIdLst>
   <p:sldIdLst>
     <p:sldId id="256" r:id="rId2"/>
@@ -13,6 +13,8 @@
     <p:sldId id="260" r:id="rId4"/>
     <p:sldId id="262" r:id="rId5"/>
     <p:sldId id="264" r:id="rId6"/>
+    <p:sldId id="265" r:id="rId7"/>
+    <p:sldId id="266" r:id="rId8"/>
   </p:sldIdLst>
   <p:sldSz cx="12192000" cy="6858000"/>
   <p:notesSz cx="6858000" cy="9144000"/>
@@ -201,7 +203,7 @@
           <a:p>
             <a:fld id="{DB406D86-2B39-4EB5-BC1A-528B84856720}" type="datetimeFigureOut">
               <a:rPr lang="ru-RU" smtClean="0"/>
-              <a:t>06.06.2024</a:t>
+              <a:t>12.06.2024</a:t>
             </a:fld>
             <a:endParaRPr lang="ru-RU"/>
           </a:p>
@@ -706,7 +708,7 @@
           <a:p>
             <a:fld id="{B93E592B-316F-437C-9AE0-9B59089EEBBB}" type="datetimeFigureOut">
               <a:rPr lang="ru-RU" smtClean="0"/>
-              <a:t>06.06.2024</a:t>
+              <a:t>12.06.2024</a:t>
             </a:fld>
             <a:endParaRPr lang="ru-RU"/>
           </a:p>
@@ -904,7 +906,7 @@
           <a:p>
             <a:fld id="{B93E592B-316F-437C-9AE0-9B59089EEBBB}" type="datetimeFigureOut">
               <a:rPr lang="ru-RU" smtClean="0"/>
-              <a:t>06.06.2024</a:t>
+              <a:t>12.06.2024</a:t>
             </a:fld>
             <a:endParaRPr lang="ru-RU"/>
           </a:p>
@@ -1112,7 +1114,7 @@
           <a:p>
             <a:fld id="{B93E592B-316F-437C-9AE0-9B59089EEBBB}" type="datetimeFigureOut">
               <a:rPr lang="ru-RU" smtClean="0"/>
-              <a:t>06.06.2024</a:t>
+              <a:t>12.06.2024</a:t>
             </a:fld>
             <a:endParaRPr lang="ru-RU"/>
           </a:p>
@@ -1310,7 +1312,7 @@
           <a:p>
             <a:fld id="{B93E592B-316F-437C-9AE0-9B59089EEBBB}" type="datetimeFigureOut">
               <a:rPr lang="ru-RU" smtClean="0"/>
-              <a:t>06.06.2024</a:t>
+              <a:t>12.06.2024</a:t>
             </a:fld>
             <a:endParaRPr lang="ru-RU"/>
           </a:p>
@@ -1585,7 +1587,7 @@
           <a:p>
             <a:fld id="{B93E592B-316F-437C-9AE0-9B59089EEBBB}" type="datetimeFigureOut">
               <a:rPr lang="ru-RU" smtClean="0"/>
-              <a:t>06.06.2024</a:t>
+              <a:t>12.06.2024</a:t>
             </a:fld>
             <a:endParaRPr lang="ru-RU"/>
           </a:p>
@@ -1850,7 +1852,7 @@
           <a:p>
             <a:fld id="{B93E592B-316F-437C-9AE0-9B59089EEBBB}" type="datetimeFigureOut">
               <a:rPr lang="ru-RU" smtClean="0"/>
-              <a:t>06.06.2024</a:t>
+              <a:t>12.06.2024</a:t>
             </a:fld>
             <a:endParaRPr lang="ru-RU"/>
           </a:p>
@@ -2262,7 +2264,7 @@
           <a:p>
             <a:fld id="{B93E592B-316F-437C-9AE0-9B59089EEBBB}" type="datetimeFigureOut">
               <a:rPr lang="ru-RU" smtClean="0"/>
-              <a:t>06.06.2024</a:t>
+              <a:t>12.06.2024</a:t>
             </a:fld>
             <a:endParaRPr lang="ru-RU"/>
           </a:p>
@@ -2403,7 +2405,7 @@
           <a:p>
             <a:fld id="{B93E592B-316F-437C-9AE0-9B59089EEBBB}" type="datetimeFigureOut">
               <a:rPr lang="ru-RU" smtClean="0"/>
-              <a:t>06.06.2024</a:t>
+              <a:t>12.06.2024</a:t>
             </a:fld>
             <a:endParaRPr lang="ru-RU"/>
           </a:p>
@@ -2516,7 +2518,7 @@
           <a:p>
             <a:fld id="{B93E592B-316F-437C-9AE0-9B59089EEBBB}" type="datetimeFigureOut">
               <a:rPr lang="ru-RU" smtClean="0"/>
-              <a:t>06.06.2024</a:t>
+              <a:t>12.06.2024</a:t>
             </a:fld>
             <a:endParaRPr lang="ru-RU"/>
           </a:p>
@@ -2827,7 +2829,7 @@
           <a:p>
             <a:fld id="{B93E592B-316F-437C-9AE0-9B59089EEBBB}" type="datetimeFigureOut">
               <a:rPr lang="ru-RU" smtClean="0"/>
-              <a:t>06.06.2024</a:t>
+              <a:t>12.06.2024</a:t>
             </a:fld>
             <a:endParaRPr lang="ru-RU"/>
           </a:p>
@@ -3115,7 +3117,7 @@
           <a:p>
             <a:fld id="{B93E592B-316F-437C-9AE0-9B59089EEBBB}" type="datetimeFigureOut">
               <a:rPr lang="ru-RU" smtClean="0"/>
-              <a:t>06.06.2024</a:t>
+              <a:t>12.06.2024</a:t>
             </a:fld>
             <a:endParaRPr lang="ru-RU"/>
           </a:p>
@@ -3356,7 +3358,7 @@
           <a:p>
             <a:fld id="{B93E592B-316F-437C-9AE0-9B59089EEBBB}" type="datetimeFigureOut">
               <a:rPr lang="ru-RU" smtClean="0"/>
-              <a:t>06.06.2024</a:t>
+              <a:t>12.06.2024</a:t>
             </a:fld>
             <a:endParaRPr lang="ru-RU"/>
           </a:p>
@@ -5939,7 +5941,21 @@
                 <a:latin typeface="Times New Roman" panose="02020603050405020304" pitchFamily="18" charset="0"/>
                 <a:cs typeface="Times New Roman" panose="02020603050405020304" pitchFamily="18" charset="0"/>
               </a:rPr>
-              <a:t>Облачные сервисы для работы с моделями НС от Яндекса</a:t>
+              <a:t>Облачные сервисы для работы с</a:t>
+            </a:r>
+            <a:r>
+              <a:rPr lang="en-US" sz="2400" dirty="0">
+                <a:latin typeface="Times New Roman" panose="02020603050405020304" pitchFamily="18" charset="0"/>
+                <a:cs typeface="Times New Roman" panose="02020603050405020304" pitchFamily="18" charset="0"/>
+              </a:rPr>
+              <a:t> </a:t>
+            </a:r>
+            <a:r>
+              <a:rPr lang="ru-RU" sz="2400" dirty="0">
+                <a:latin typeface="Times New Roman" panose="02020603050405020304" pitchFamily="18" charset="0"/>
+                <a:cs typeface="Times New Roman" panose="02020603050405020304" pitchFamily="18" charset="0"/>
+              </a:rPr>
+              <a:t>заранее обученными моделями НС от Яндекса</a:t>
             </a:r>
             <a:r>
               <a:rPr lang="en-US" sz="2400" dirty="0">
@@ -5959,6 +5975,471 @@
     <p:extLst>
       <p:ext uri="{BB962C8B-B14F-4D97-AF65-F5344CB8AC3E}">
         <p14:creationId xmlns:p14="http://schemas.microsoft.com/office/powerpoint/2010/main" val="2665051556"/>
+      </p:ext>
+    </p:extLst>
+  </p:cSld>
+  <p:clrMapOvr>
+    <a:masterClrMapping/>
+  </p:clrMapOvr>
+</p:sld>
+</file>
+
+<file path=ppt/slides/slide6.xml><?xml version="1.0" encoding="utf-8"?>
+<p:sld xmlns:a="http://schemas.openxmlformats.org/drawingml/2006/main" xmlns:r="http://schemas.openxmlformats.org/officeDocument/2006/relationships" xmlns:p="http://schemas.openxmlformats.org/presentationml/2006/main">
+  <p:cSld>
+    <p:spTree>
+      <p:nvGrpSpPr>
+        <p:cNvPr id="1" name=""/>
+        <p:cNvGrpSpPr/>
+        <p:nvPr/>
+      </p:nvGrpSpPr>
+      <p:grpSpPr>
+        <a:xfrm>
+          <a:off x="0" y="0"/>
+          <a:ext cx="0" cy="0"/>
+          <a:chOff x="0" y="0"/>
+          <a:chExt cx="0" cy="0"/>
+        </a:xfrm>
+      </p:grpSpPr>
+      <p:sp>
+        <p:nvSpPr>
+          <p:cNvPr id="4" name="Объект 3">
+            <a:extLst>
+              <a:ext uri="{FF2B5EF4-FFF2-40B4-BE49-F238E27FC236}">
+                <a16:creationId xmlns:a16="http://schemas.microsoft.com/office/drawing/2014/main" id="{6FE20B52-975D-25F3-3BC2-29E51C3A9E13}"/>
+              </a:ext>
+            </a:extLst>
+          </p:cNvPr>
+          <p:cNvSpPr>
+            <a:spLocks noGrp="1"/>
+          </p:cNvSpPr>
+          <p:nvPr>
+            <p:ph sz="half" idx="1"/>
+          </p:nvPr>
+        </p:nvSpPr>
+        <p:spPr>
+          <a:xfrm>
+            <a:off x="838200" y="1825625"/>
+            <a:ext cx="6914322" cy="4351338"/>
+          </a:xfrm>
+        </p:spPr>
+        <p:txBody>
+          <a:bodyPr/>
+          <a:lstStyle/>
+          <a:p>
+            <a:pPr marL="0" indent="0">
+              <a:lnSpc>
+                <a:spcPct val="150000"/>
+              </a:lnSpc>
+              <a:buNone/>
+            </a:pPr>
+            <a:r>
+              <a:rPr lang="ru-RU" sz="1800" dirty="0">
+                <a:latin typeface="Times New Roman" panose="02020603050405020304" pitchFamily="18" charset="0"/>
+                <a:cs typeface="Times New Roman" panose="02020603050405020304" pitchFamily="18" charset="0"/>
+              </a:rPr>
+              <a:t>Алгоритм представляет собой следующее</a:t>
+            </a:r>
+            <a:r>
+              <a:rPr lang="en-US" sz="1800" dirty="0">
+                <a:latin typeface="Times New Roman" panose="02020603050405020304" pitchFamily="18" charset="0"/>
+                <a:cs typeface="Times New Roman" panose="02020603050405020304" pitchFamily="18" charset="0"/>
+              </a:rPr>
+              <a:t>:</a:t>
+            </a:r>
+            <a:endParaRPr lang="ru-RU" sz="1800" dirty="0">
+              <a:latin typeface="Times New Roman" panose="02020603050405020304" pitchFamily="18" charset="0"/>
+              <a:cs typeface="Times New Roman" panose="02020603050405020304" pitchFamily="18" charset="0"/>
+            </a:endParaRPr>
+          </a:p>
+          <a:p>
+            <a:pPr marL="514350" indent="-514350">
+              <a:lnSpc>
+                <a:spcPct val="150000"/>
+              </a:lnSpc>
+              <a:buFont typeface="+mj-lt"/>
+              <a:buAutoNum type="arabicPeriod"/>
+            </a:pPr>
+            <a:r>
+              <a:rPr lang="ru-RU" sz="1800" dirty="0">
+                <a:latin typeface="Times New Roman" panose="02020603050405020304" pitchFamily="18" charset="0"/>
+                <a:cs typeface="Times New Roman" panose="02020603050405020304" pitchFamily="18" charset="0"/>
+              </a:rPr>
+              <a:t>Выборка и обработка выделенного пользователем текста</a:t>
+            </a:r>
+            <a:r>
+              <a:rPr lang="en-US" sz="1800" dirty="0">
+                <a:latin typeface="Times New Roman" panose="02020603050405020304" pitchFamily="18" charset="0"/>
+                <a:cs typeface="Times New Roman" panose="02020603050405020304" pitchFamily="18" charset="0"/>
+              </a:rPr>
+              <a:t>;</a:t>
+            </a:r>
+            <a:endParaRPr lang="ru-RU" sz="1800" dirty="0">
+              <a:latin typeface="Times New Roman" panose="02020603050405020304" pitchFamily="18" charset="0"/>
+              <a:cs typeface="Times New Roman" panose="02020603050405020304" pitchFamily="18" charset="0"/>
+            </a:endParaRPr>
+          </a:p>
+          <a:p>
+            <a:pPr marL="514350" indent="-514350">
+              <a:lnSpc>
+                <a:spcPct val="150000"/>
+              </a:lnSpc>
+              <a:buFont typeface="+mj-lt"/>
+              <a:buAutoNum type="arabicPeriod"/>
+            </a:pPr>
+            <a:r>
+              <a:rPr lang="ru-RU" sz="1800" dirty="0">
+                <a:latin typeface="Times New Roman" panose="02020603050405020304" pitchFamily="18" charset="0"/>
+                <a:cs typeface="Times New Roman" panose="02020603050405020304" pitchFamily="18" charset="0"/>
+              </a:rPr>
+              <a:t>Передача серверу текста</a:t>
+            </a:r>
+            <a:r>
+              <a:rPr lang="en-US" sz="1800" dirty="0">
+                <a:latin typeface="Times New Roman" panose="02020603050405020304" pitchFamily="18" charset="0"/>
+                <a:cs typeface="Times New Roman" panose="02020603050405020304" pitchFamily="18" charset="0"/>
+              </a:rPr>
+              <a:t>;</a:t>
+            </a:r>
+            <a:endParaRPr lang="ru-RU" sz="1800" dirty="0">
+              <a:latin typeface="Times New Roman" panose="02020603050405020304" pitchFamily="18" charset="0"/>
+              <a:cs typeface="Times New Roman" panose="02020603050405020304" pitchFamily="18" charset="0"/>
+            </a:endParaRPr>
+          </a:p>
+          <a:p>
+            <a:pPr marL="514350" indent="-514350">
+              <a:lnSpc>
+                <a:spcPct val="150000"/>
+              </a:lnSpc>
+              <a:buFont typeface="+mj-lt"/>
+              <a:buAutoNum type="arabicPeriod"/>
+            </a:pPr>
+            <a:r>
+              <a:rPr lang="ru-RU" sz="1800" dirty="0">
+                <a:latin typeface="Times New Roman" panose="02020603050405020304" pitchFamily="18" charset="0"/>
+                <a:cs typeface="Times New Roman" panose="02020603050405020304" pitchFamily="18" charset="0"/>
+              </a:rPr>
+              <a:t>Сервер формирует запрос</a:t>
+            </a:r>
+            <a:r>
+              <a:rPr lang="en-US" sz="1800" dirty="0">
+                <a:latin typeface="Times New Roman" panose="02020603050405020304" pitchFamily="18" charset="0"/>
+                <a:cs typeface="Times New Roman" panose="02020603050405020304" pitchFamily="18" charset="0"/>
+              </a:rPr>
+              <a:t>;</a:t>
+            </a:r>
+            <a:endParaRPr lang="ru-RU" sz="1800" dirty="0">
+              <a:latin typeface="Times New Roman" panose="02020603050405020304" pitchFamily="18" charset="0"/>
+              <a:cs typeface="Times New Roman" panose="02020603050405020304" pitchFamily="18" charset="0"/>
+            </a:endParaRPr>
+          </a:p>
+          <a:p>
+            <a:pPr marL="514350" indent="-514350">
+              <a:lnSpc>
+                <a:spcPct val="150000"/>
+              </a:lnSpc>
+              <a:buFont typeface="+mj-lt"/>
+              <a:buAutoNum type="arabicPeriod"/>
+            </a:pPr>
+            <a:r>
+              <a:rPr lang="ru-RU" sz="1800" dirty="0">
+                <a:latin typeface="Times New Roman" panose="02020603050405020304" pitchFamily="18" charset="0"/>
+                <a:cs typeface="Times New Roman" panose="02020603050405020304" pitchFamily="18" charset="0"/>
+              </a:rPr>
+              <a:t>Отправка </a:t>
+            </a:r>
+            <a:r>
+              <a:rPr lang="en-US" sz="1800" dirty="0">
+                <a:latin typeface="Times New Roman" panose="02020603050405020304" pitchFamily="18" charset="0"/>
+                <a:cs typeface="Times New Roman" panose="02020603050405020304" pitchFamily="18" charset="0"/>
+              </a:rPr>
+              <a:t>API </a:t>
+            </a:r>
+            <a:r>
+              <a:rPr lang="ru-RU" sz="1800" dirty="0">
+                <a:latin typeface="Times New Roman" panose="02020603050405020304" pitchFamily="18" charset="0"/>
+                <a:cs typeface="Times New Roman" panose="02020603050405020304" pitchFamily="18" charset="0"/>
+              </a:rPr>
+              <a:t>ИИ</a:t>
+            </a:r>
+            <a:r>
+              <a:rPr lang="en-US" sz="1800" dirty="0">
+                <a:latin typeface="Times New Roman" panose="02020603050405020304" pitchFamily="18" charset="0"/>
+                <a:cs typeface="Times New Roman" panose="02020603050405020304" pitchFamily="18" charset="0"/>
+              </a:rPr>
+              <a:t>;</a:t>
+            </a:r>
+            <a:endParaRPr lang="ru-RU" sz="1800" dirty="0">
+              <a:latin typeface="Times New Roman" panose="02020603050405020304" pitchFamily="18" charset="0"/>
+              <a:cs typeface="Times New Roman" panose="02020603050405020304" pitchFamily="18" charset="0"/>
+            </a:endParaRPr>
+          </a:p>
+          <a:p>
+            <a:pPr marL="514350" indent="-514350">
+              <a:lnSpc>
+                <a:spcPct val="150000"/>
+              </a:lnSpc>
+              <a:buFont typeface="+mj-lt"/>
+              <a:buAutoNum type="arabicPeriod"/>
+            </a:pPr>
+            <a:r>
+              <a:rPr lang="ru-RU" sz="1800" dirty="0">
+                <a:latin typeface="Times New Roman" panose="02020603050405020304" pitchFamily="18" charset="0"/>
+                <a:cs typeface="Times New Roman" panose="02020603050405020304" pitchFamily="18" charset="0"/>
+              </a:rPr>
+              <a:t>Получение и обработка ответа сервером</a:t>
+            </a:r>
+            <a:r>
+              <a:rPr lang="en-US" sz="1800" dirty="0">
+                <a:latin typeface="Times New Roman" panose="02020603050405020304" pitchFamily="18" charset="0"/>
+                <a:cs typeface="Times New Roman" panose="02020603050405020304" pitchFamily="18" charset="0"/>
+              </a:rPr>
+              <a:t>;</a:t>
+            </a:r>
+            <a:endParaRPr lang="ru-RU" sz="1800" dirty="0">
+              <a:latin typeface="Times New Roman" panose="02020603050405020304" pitchFamily="18" charset="0"/>
+              <a:cs typeface="Times New Roman" panose="02020603050405020304" pitchFamily="18" charset="0"/>
+            </a:endParaRPr>
+          </a:p>
+          <a:p>
+            <a:pPr marL="514350" indent="-514350">
+              <a:lnSpc>
+                <a:spcPct val="150000"/>
+              </a:lnSpc>
+              <a:buFont typeface="+mj-lt"/>
+              <a:buAutoNum type="arabicPeriod"/>
+            </a:pPr>
+            <a:r>
+              <a:rPr lang="ru-RU" sz="1800" dirty="0">
+                <a:latin typeface="Times New Roman" panose="02020603050405020304" pitchFamily="18" charset="0"/>
+                <a:cs typeface="Times New Roman" panose="02020603050405020304" pitchFamily="18" charset="0"/>
+              </a:rPr>
+              <a:t>Передача клиенту</a:t>
+            </a:r>
+            <a:r>
+              <a:rPr lang="en-US" sz="1800">
+                <a:latin typeface="Times New Roman" panose="02020603050405020304" pitchFamily="18" charset="0"/>
+                <a:cs typeface="Times New Roman" panose="02020603050405020304" pitchFamily="18" charset="0"/>
+              </a:rPr>
+              <a:t>.</a:t>
+            </a:r>
+            <a:endParaRPr lang="en-US" sz="1800" dirty="0">
+              <a:latin typeface="Times New Roman" panose="02020603050405020304" pitchFamily="18" charset="0"/>
+              <a:cs typeface="Times New Roman" panose="02020603050405020304" pitchFamily="18" charset="0"/>
+            </a:endParaRPr>
+          </a:p>
+          <a:p>
+            <a:pPr marL="0" indent="0">
+              <a:buNone/>
+            </a:pPr>
+            <a:endParaRPr lang="ru-RU" dirty="0"/>
+          </a:p>
+        </p:txBody>
+      </p:sp>
+      <p:pic>
+        <p:nvPicPr>
+          <p:cNvPr id="3" name="Объект 2">
+            <a:extLst>
+              <a:ext uri="{FF2B5EF4-FFF2-40B4-BE49-F238E27FC236}">
+                <a16:creationId xmlns:a16="http://schemas.microsoft.com/office/drawing/2014/main" id="{75196021-CC2A-B5A2-0DE7-DB2E2EA67EBE}"/>
+              </a:ext>
+            </a:extLst>
+          </p:cNvPr>
+          <p:cNvPicPr>
+            <a:picLocks noGrp="1" noChangeAspect="1"/>
+          </p:cNvPicPr>
+          <p:nvPr>
+            <p:ph sz="half" idx="2"/>
+          </p:nvPr>
+        </p:nvPicPr>
+        <p:blipFill>
+          <a:blip r:embed="rId2">
+            <a:extLst>
+              <a:ext uri="{28A0092B-C50C-407E-A947-70E740481C1C}">
+                <a14:useLocalDpi xmlns:a14="http://schemas.microsoft.com/office/drawing/2010/main" val="0"/>
+              </a:ext>
+            </a:extLst>
+          </a:blip>
+          <a:stretch>
+            <a:fillRect/>
+          </a:stretch>
+        </p:blipFill>
+        <p:spPr>
+          <a:xfrm>
+            <a:off x="8792817" y="497987"/>
+            <a:ext cx="1712390" cy="5678976"/>
+          </a:xfrm>
+        </p:spPr>
+      </p:pic>
+      <p:sp>
+        <p:nvSpPr>
+          <p:cNvPr id="6" name="Заголовок 1">
+            <a:extLst>
+              <a:ext uri="{FF2B5EF4-FFF2-40B4-BE49-F238E27FC236}">
+                <a16:creationId xmlns:a16="http://schemas.microsoft.com/office/drawing/2014/main" id="{76277648-A197-6531-0425-FA34692EAC27}"/>
+              </a:ext>
+            </a:extLst>
+          </p:cNvPr>
+          <p:cNvSpPr>
+            <a:spLocks noGrp="1"/>
+          </p:cNvSpPr>
+          <p:nvPr>
+            <p:ph type="title"/>
+          </p:nvPr>
+        </p:nvSpPr>
+        <p:spPr>
+          <a:xfrm>
+            <a:off x="838200" y="365125"/>
+            <a:ext cx="6980583" cy="1325563"/>
+          </a:xfrm>
+        </p:spPr>
+        <p:txBody>
+          <a:bodyPr>
+            <a:normAutofit/>
+          </a:bodyPr>
+          <a:lstStyle/>
+          <a:p>
+            <a:r>
+              <a:rPr lang="ru-RU" sz="3600" b="1" u="sng" dirty="0"/>
+              <a:t>Обобщение текста</a:t>
+            </a:r>
+          </a:p>
+        </p:txBody>
+      </p:sp>
+    </p:spTree>
+    <p:extLst>
+      <p:ext uri="{BB962C8B-B14F-4D97-AF65-F5344CB8AC3E}">
+        <p14:creationId xmlns:p14="http://schemas.microsoft.com/office/powerpoint/2010/main" val="3592267970"/>
+      </p:ext>
+    </p:extLst>
+  </p:cSld>
+  <p:clrMapOvr>
+    <a:masterClrMapping/>
+  </p:clrMapOvr>
+</p:sld>
+</file>
+
+<file path=ppt/slides/slide7.xml><?xml version="1.0" encoding="utf-8"?>
+<p:sld xmlns:a="http://schemas.openxmlformats.org/drawingml/2006/main" xmlns:r="http://schemas.openxmlformats.org/officeDocument/2006/relationships" xmlns:p="http://schemas.openxmlformats.org/presentationml/2006/main">
+  <p:cSld>
+    <p:spTree>
+      <p:nvGrpSpPr>
+        <p:cNvPr id="1" name=""/>
+        <p:cNvGrpSpPr/>
+        <p:nvPr/>
+      </p:nvGrpSpPr>
+      <p:grpSpPr>
+        <a:xfrm>
+          <a:off x="0" y="0"/>
+          <a:ext cx="0" cy="0"/>
+          <a:chOff x="0" y="0"/>
+          <a:chExt cx="0" cy="0"/>
+        </a:xfrm>
+      </p:grpSpPr>
+      <p:sp>
+        <p:nvSpPr>
+          <p:cNvPr id="2" name="Заголовок 1">
+            <a:extLst>
+              <a:ext uri="{FF2B5EF4-FFF2-40B4-BE49-F238E27FC236}">
+                <a16:creationId xmlns:a16="http://schemas.microsoft.com/office/drawing/2014/main" id="{2C64B6FC-9AA1-371B-6B3C-18F406082223}"/>
+              </a:ext>
+            </a:extLst>
+          </p:cNvPr>
+          <p:cNvSpPr>
+            <a:spLocks noGrp="1"/>
+          </p:cNvSpPr>
+          <p:nvPr>
+            <p:ph type="title"/>
+          </p:nvPr>
+        </p:nvSpPr>
+        <p:spPr>
+          <a:xfrm>
+            <a:off x="838200" y="365125"/>
+            <a:ext cx="6675783" cy="1325563"/>
+          </a:xfrm>
+        </p:spPr>
+        <p:txBody>
+          <a:bodyPr/>
+          <a:lstStyle/>
+          <a:p>
+            <a:r>
+              <a:rPr lang="ru-RU" sz="4400" b="1" u="sng" dirty="0"/>
+              <a:t>Определение слова</a:t>
+            </a:r>
+            <a:endParaRPr lang="ru-RU" dirty="0"/>
+          </a:p>
+        </p:txBody>
+      </p:sp>
+      <p:sp>
+        <p:nvSpPr>
+          <p:cNvPr id="3" name="Объект 2">
+            <a:extLst>
+              <a:ext uri="{FF2B5EF4-FFF2-40B4-BE49-F238E27FC236}">
+                <a16:creationId xmlns:a16="http://schemas.microsoft.com/office/drawing/2014/main" id="{6ADEBD5D-EB10-0504-FCF5-BED349E1AAEF}"/>
+              </a:ext>
+            </a:extLst>
+          </p:cNvPr>
+          <p:cNvSpPr>
+            <a:spLocks noGrp="1"/>
+          </p:cNvSpPr>
+          <p:nvPr>
+            <p:ph sz="half" idx="1"/>
+          </p:nvPr>
+        </p:nvSpPr>
+        <p:spPr>
+          <a:xfrm>
+            <a:off x="838200" y="1825625"/>
+            <a:ext cx="6675782" cy="4351338"/>
+          </a:xfrm>
+        </p:spPr>
+        <p:txBody>
+          <a:bodyPr/>
+          <a:lstStyle/>
+          <a:p>
+            <a:r>
+              <a:rPr lang="ru-RU" dirty="0"/>
+              <a:t>Проверка что выбрано именно слово</a:t>
+            </a:r>
+          </a:p>
+          <a:p>
+            <a:endParaRPr lang="ru-RU" dirty="0"/>
+          </a:p>
+        </p:txBody>
+      </p:sp>
+      <p:sp>
+        <p:nvSpPr>
+          <p:cNvPr id="4" name="Объект 3">
+            <a:extLst>
+              <a:ext uri="{FF2B5EF4-FFF2-40B4-BE49-F238E27FC236}">
+                <a16:creationId xmlns:a16="http://schemas.microsoft.com/office/drawing/2014/main" id="{531F3E3D-168C-C68B-20DA-F86845877763}"/>
+              </a:ext>
+            </a:extLst>
+          </p:cNvPr>
+          <p:cNvSpPr>
+            <a:spLocks noGrp="1"/>
+          </p:cNvSpPr>
+          <p:nvPr>
+            <p:ph sz="half" idx="2"/>
+          </p:nvPr>
+        </p:nvSpPr>
+        <p:spPr>
+          <a:xfrm>
+            <a:off x="7759148" y="1825625"/>
+            <a:ext cx="3594651" cy="4351338"/>
+          </a:xfrm>
+        </p:spPr>
+        <p:txBody>
+          <a:bodyPr/>
+          <a:lstStyle/>
+          <a:p>
+            <a:endParaRPr lang="ru-RU" dirty="0"/>
+          </a:p>
+        </p:txBody>
+      </p:sp>
+    </p:spTree>
+    <p:extLst>
+      <p:ext uri="{BB962C8B-B14F-4D97-AF65-F5344CB8AC3E}">
+        <p14:creationId xmlns:p14="http://schemas.microsoft.com/office/powerpoint/2010/main" val="1752438457"/>
       </p:ext>
     </p:extLst>
   </p:cSld>

</xml_diff>

<commit_message>
Fix time tracking problem with a logged in user on multiple device with opened same book by adding `Ticket` entity
Refactor code, remove WebSocketController class

Update launch.json and settings.json

Update README.md
</commit_message>
<xml_diff>
--- a/docs/Презентация.pptx
+++ b/docs/Презентация.pptx
@@ -5,7 +5,7 @@
     <p:sldMasterId id="2147483803" r:id="rId1"/>
   </p:sldMasterIdLst>
   <p:notesMasterIdLst>
-    <p:notesMasterId r:id="rId16"/>
+    <p:notesMasterId r:id="rId13"/>
   </p:notesMasterIdLst>
   <p:sldIdLst>
     <p:sldId id="256" r:id="rId2"/>
@@ -14,14 +14,11 @@
     <p:sldId id="262" r:id="rId5"/>
     <p:sldId id="264" r:id="rId6"/>
     <p:sldId id="269" r:id="rId7"/>
-    <p:sldId id="270" r:id="rId8"/>
-    <p:sldId id="271" r:id="rId9"/>
-    <p:sldId id="272" r:id="rId10"/>
-    <p:sldId id="273" r:id="rId11"/>
-    <p:sldId id="267" r:id="rId12"/>
-    <p:sldId id="265" r:id="rId13"/>
-    <p:sldId id="266" r:id="rId14"/>
-    <p:sldId id="268" r:id="rId15"/>
+    <p:sldId id="272" r:id="rId8"/>
+    <p:sldId id="273" r:id="rId9"/>
+    <p:sldId id="265" r:id="rId10"/>
+    <p:sldId id="266" r:id="rId11"/>
+    <p:sldId id="268" r:id="rId12"/>
   </p:sldIdLst>
   <p:sldSz cx="9144000" cy="6858000" type="screen4x3"/>
   <p:notesSz cx="6858000" cy="9144000"/>
@@ -210,7 +207,7 @@
           <a:p>
             <a:fld id="{DB406D86-2B39-4EB5-BC1A-528B84856720}" type="datetimeFigureOut">
               <a:rPr lang="ru-RU" smtClean="0"/>
-              <a:t>15.06.2024</a:t>
+              <a:t>18.06.2024</a:t>
             </a:fld>
             <a:endParaRPr lang="ru-RU"/>
           </a:p>
@@ -643,185 +640,7 @@
           <a:p>
             <a:fld id="{600DD7E4-AEBE-4F2D-81C5-E23D161449AB}" type="slidenum">
               <a:rPr lang="ru-RU" smtClean="0"/>
-              <a:t>7</a:t>
-            </a:fld>
-            <a:endParaRPr lang="ru-RU"/>
-          </a:p>
-        </p:txBody>
-      </p:sp>
-    </p:spTree>
-    <p:extLst>
-      <p:ext uri="{BB962C8B-B14F-4D97-AF65-F5344CB8AC3E}">
-        <p14:creationId xmlns:p14="http://schemas.microsoft.com/office/powerpoint/2010/main" val="935467296"/>
-      </p:ext>
-    </p:extLst>
-  </p:cSld>
-  <p:clrMapOvr>
-    <a:masterClrMapping/>
-  </p:clrMapOvr>
-</p:notes>
-</file>
-
-<file path=ppt/notesSlides/notesSlide3.xml><?xml version="1.0" encoding="utf-8"?>
-<p:notes xmlns:a="http://schemas.openxmlformats.org/drawingml/2006/main" xmlns:r="http://schemas.openxmlformats.org/officeDocument/2006/relationships" xmlns:p="http://schemas.openxmlformats.org/presentationml/2006/main">
-  <p:cSld>
-    <p:spTree>
-      <p:nvGrpSpPr>
-        <p:cNvPr id="1" name=""/>
-        <p:cNvGrpSpPr/>
-        <p:nvPr/>
-      </p:nvGrpSpPr>
-      <p:grpSpPr>
-        <a:xfrm>
-          <a:off x="0" y="0"/>
-          <a:ext cx="0" cy="0"/>
-          <a:chOff x="0" y="0"/>
-          <a:chExt cx="0" cy="0"/>
-        </a:xfrm>
-      </p:grpSpPr>
-      <p:sp>
-        <p:nvSpPr>
-          <p:cNvPr id="2" name="Образ слайда 1"/>
-          <p:cNvSpPr>
-            <a:spLocks noGrp="1" noRot="1" noChangeAspect="1"/>
-          </p:cNvSpPr>
-          <p:nvPr>
-            <p:ph type="sldImg"/>
-          </p:nvPr>
-        </p:nvSpPr>
-        <p:spPr>
-          <a:xfrm>
-            <a:off x="1371600" y="1143000"/>
-            <a:ext cx="4114800" cy="3086100"/>
-          </a:xfrm>
-        </p:spPr>
-      </p:sp>
-      <p:sp>
-        <p:nvSpPr>
-          <p:cNvPr id="3" name="Заметки 2"/>
-          <p:cNvSpPr>
-            <a:spLocks noGrp="1"/>
-          </p:cNvSpPr>
-          <p:nvPr>
-            <p:ph type="body" idx="1"/>
-          </p:nvPr>
-        </p:nvSpPr>
-        <p:spPr/>
-        <p:txBody>
-          <a:bodyPr/>
-          <a:lstStyle/>
-          <a:p>
-            <a:endParaRPr lang="ru-RU" dirty="0"/>
-          </a:p>
-        </p:txBody>
-      </p:sp>
-      <p:sp>
-        <p:nvSpPr>
-          <p:cNvPr id="4" name="Номер слайда 3"/>
-          <p:cNvSpPr>
-            <a:spLocks noGrp="1"/>
-          </p:cNvSpPr>
-          <p:nvPr>
-            <p:ph type="sldNum" sz="quarter" idx="5"/>
-          </p:nvPr>
-        </p:nvSpPr>
-        <p:spPr/>
-        <p:txBody>
-          <a:bodyPr/>
-          <a:lstStyle/>
-          <a:p>
-            <a:fld id="{600DD7E4-AEBE-4F2D-81C5-E23D161449AB}" type="slidenum">
-              <a:rPr lang="ru-RU" smtClean="0"/>
               <a:t>8</a:t>
-            </a:fld>
-            <a:endParaRPr lang="ru-RU"/>
-          </a:p>
-        </p:txBody>
-      </p:sp>
-    </p:spTree>
-    <p:extLst>
-      <p:ext uri="{BB962C8B-B14F-4D97-AF65-F5344CB8AC3E}">
-        <p14:creationId xmlns:p14="http://schemas.microsoft.com/office/powerpoint/2010/main" val="1220038699"/>
-      </p:ext>
-    </p:extLst>
-  </p:cSld>
-  <p:clrMapOvr>
-    <a:masterClrMapping/>
-  </p:clrMapOvr>
-</p:notes>
-</file>
-
-<file path=ppt/notesSlides/notesSlide4.xml><?xml version="1.0" encoding="utf-8"?>
-<p:notes xmlns:a="http://schemas.openxmlformats.org/drawingml/2006/main" xmlns:r="http://schemas.openxmlformats.org/officeDocument/2006/relationships" xmlns:p="http://schemas.openxmlformats.org/presentationml/2006/main">
-  <p:cSld>
-    <p:spTree>
-      <p:nvGrpSpPr>
-        <p:cNvPr id="1" name=""/>
-        <p:cNvGrpSpPr/>
-        <p:nvPr/>
-      </p:nvGrpSpPr>
-      <p:grpSpPr>
-        <a:xfrm>
-          <a:off x="0" y="0"/>
-          <a:ext cx="0" cy="0"/>
-          <a:chOff x="0" y="0"/>
-          <a:chExt cx="0" cy="0"/>
-        </a:xfrm>
-      </p:grpSpPr>
-      <p:sp>
-        <p:nvSpPr>
-          <p:cNvPr id="2" name="Образ слайда 1"/>
-          <p:cNvSpPr>
-            <a:spLocks noGrp="1" noRot="1" noChangeAspect="1"/>
-          </p:cNvSpPr>
-          <p:nvPr>
-            <p:ph type="sldImg"/>
-          </p:nvPr>
-        </p:nvSpPr>
-        <p:spPr>
-          <a:xfrm>
-            <a:off x="1371600" y="1143000"/>
-            <a:ext cx="4114800" cy="3086100"/>
-          </a:xfrm>
-        </p:spPr>
-      </p:sp>
-      <p:sp>
-        <p:nvSpPr>
-          <p:cNvPr id="3" name="Заметки 2"/>
-          <p:cNvSpPr>
-            <a:spLocks noGrp="1"/>
-          </p:cNvSpPr>
-          <p:nvPr>
-            <p:ph type="body" idx="1"/>
-          </p:nvPr>
-        </p:nvSpPr>
-        <p:spPr/>
-        <p:txBody>
-          <a:bodyPr/>
-          <a:lstStyle/>
-          <a:p>
-            <a:endParaRPr lang="ru-RU" dirty="0"/>
-          </a:p>
-        </p:txBody>
-      </p:sp>
-      <p:sp>
-        <p:nvSpPr>
-          <p:cNvPr id="4" name="Номер слайда 3"/>
-          <p:cNvSpPr>
-            <a:spLocks noGrp="1"/>
-          </p:cNvSpPr>
-          <p:nvPr>
-            <p:ph type="sldNum" sz="quarter" idx="5"/>
-          </p:nvPr>
-        </p:nvSpPr>
-        <p:spPr/>
-        <p:txBody>
-          <a:bodyPr/>
-          <a:lstStyle/>
-          <a:p>
-            <a:fld id="{600DD7E4-AEBE-4F2D-81C5-E23D161449AB}" type="slidenum">
-              <a:rPr lang="ru-RU" smtClean="0"/>
-              <a:t>10</a:t>
             </a:fld>
             <a:endParaRPr lang="ru-RU"/>
           </a:p>
@@ -1047,7 +866,7 @@
           <a:p>
             <a:fld id="{B93E592B-316F-437C-9AE0-9B59089EEBBB}" type="datetimeFigureOut">
               <a:rPr lang="ru-RU" smtClean="0"/>
-              <a:t>15.06.2024</a:t>
+              <a:t>18.06.2024</a:t>
             </a:fld>
             <a:endParaRPr lang="ru-RU"/>
           </a:p>
@@ -1239,7 +1058,7 @@
           <a:p>
             <a:fld id="{B93E592B-316F-437C-9AE0-9B59089EEBBB}" type="datetimeFigureOut">
               <a:rPr lang="ru-RU" smtClean="0"/>
-              <a:t>15.06.2024</a:t>
+              <a:t>18.06.2024</a:t>
             </a:fld>
             <a:endParaRPr lang="ru-RU"/>
           </a:p>
@@ -1419,7 +1238,7 @@
           <a:p>
             <a:fld id="{B93E592B-316F-437C-9AE0-9B59089EEBBB}" type="datetimeFigureOut">
               <a:rPr lang="ru-RU" smtClean="0"/>
-              <a:t>15.06.2024</a:t>
+              <a:t>18.06.2024</a:t>
             </a:fld>
             <a:endParaRPr lang="ru-RU"/>
           </a:p>
@@ -1589,7 +1408,7 @@
           <a:p>
             <a:fld id="{B93E592B-316F-437C-9AE0-9B59089EEBBB}" type="datetimeFigureOut">
               <a:rPr lang="ru-RU" smtClean="0"/>
-              <a:t>15.06.2024</a:t>
+              <a:t>18.06.2024</a:t>
             </a:fld>
             <a:endParaRPr lang="ru-RU"/>
           </a:p>
@@ -1843,7 +1662,7 @@
           <a:p>
             <a:fld id="{B93E592B-316F-437C-9AE0-9B59089EEBBB}" type="datetimeFigureOut">
               <a:rPr lang="ru-RU" smtClean="0"/>
-              <a:t>15.06.2024</a:t>
+              <a:t>18.06.2024</a:t>
             </a:fld>
             <a:endParaRPr lang="ru-RU"/>
           </a:p>
@@ -2169,7 +1988,7 @@
           <a:p>
             <a:fld id="{B93E592B-316F-437C-9AE0-9B59089EEBBB}" type="datetimeFigureOut">
               <a:rPr lang="ru-RU" smtClean="0"/>
-              <a:t>15.06.2024</a:t>
+              <a:t>18.06.2024</a:t>
             </a:fld>
             <a:endParaRPr lang="ru-RU"/>
           </a:p>
@@ -2589,7 +2408,7 @@
           <a:p>
             <a:fld id="{B93E592B-316F-437C-9AE0-9B59089EEBBB}" type="datetimeFigureOut">
               <a:rPr lang="ru-RU" smtClean="0"/>
-              <a:t>15.06.2024</a:t>
+              <a:t>18.06.2024</a:t>
             </a:fld>
             <a:endParaRPr lang="ru-RU"/>
           </a:p>
@@ -2707,7 +2526,7 @@
           <a:p>
             <a:fld id="{B93E592B-316F-437C-9AE0-9B59089EEBBB}" type="datetimeFigureOut">
               <a:rPr lang="ru-RU" smtClean="0"/>
-              <a:t>15.06.2024</a:t>
+              <a:t>18.06.2024</a:t>
             </a:fld>
             <a:endParaRPr lang="ru-RU"/>
           </a:p>
@@ -2802,7 +2621,7 @@
           <a:p>
             <a:fld id="{B93E592B-316F-437C-9AE0-9B59089EEBBB}" type="datetimeFigureOut">
               <a:rPr lang="ru-RU" smtClean="0"/>
-              <a:t>15.06.2024</a:t>
+              <a:t>18.06.2024</a:t>
             </a:fld>
             <a:endParaRPr lang="ru-RU"/>
           </a:p>
@@ -3089,7 +2908,7 @@
           <a:p>
             <a:fld id="{B93E592B-316F-437C-9AE0-9B59089EEBBB}" type="datetimeFigureOut">
               <a:rPr lang="ru-RU" smtClean="0"/>
-              <a:t>15.06.2024</a:t>
+              <a:t>18.06.2024</a:t>
             </a:fld>
             <a:endParaRPr lang="ru-RU"/>
           </a:p>
@@ -3411,7 +3230,7 @@
           <a:p>
             <a:fld id="{B93E592B-316F-437C-9AE0-9B59089EEBBB}" type="datetimeFigureOut">
               <a:rPr lang="ru-RU" smtClean="0"/>
-              <a:t>15.06.2024</a:t>
+              <a:t>18.06.2024</a:t>
             </a:fld>
             <a:endParaRPr lang="ru-RU"/>
           </a:p>
@@ -3665,7 +3484,7 @@
           <a:p>
             <a:fld id="{B93E592B-316F-437C-9AE0-9B59089EEBBB}" type="datetimeFigureOut">
               <a:rPr lang="ru-RU" smtClean="0"/>
-              <a:t>15.06.2024</a:t>
+              <a:t>18.06.2024</a:t>
             </a:fld>
             <a:endParaRPr lang="ru-RU"/>
           </a:p>
@@ -4380,7 +4199,7 @@
           <p:cNvPr id="2" name="Заголовок 1">
             <a:extLst>
               <a:ext uri="{FF2B5EF4-FFF2-40B4-BE49-F238E27FC236}">
-                <a16:creationId xmlns:a16="http://schemas.microsoft.com/office/drawing/2014/main" id="{2E82A089-67C8-6737-768B-5D7EBF7B9E0E}"/>
+                <a16:creationId xmlns:a16="http://schemas.microsoft.com/office/drawing/2014/main" id="{2C64B6FC-9AA1-371B-6B3C-18F406082223}"/>
               </a:ext>
             </a:extLst>
           </p:cNvPr>
@@ -4393,160 +4212,8 @@
         </p:nvSpPr>
         <p:spPr>
           <a:xfrm>
-            <a:off x="383722" y="1190353"/>
-            <a:ext cx="7269480" cy="994172"/>
-          </a:xfrm>
-        </p:spPr>
-        <p:txBody>
-          <a:bodyPr>
-            <a:normAutofit fontScale="90000"/>
-          </a:bodyPr>
-          <a:lstStyle/>
-          <a:p>
-            <a:r>
-              <a:rPr lang="ru-RU" b="1" u="sng" dirty="0"/>
-              <a:t>Страница просмотра документа</a:t>
-            </a:r>
-            <a:endParaRPr lang="ru-RU" dirty="0"/>
-          </a:p>
-        </p:txBody>
-      </p:sp>
-      <p:pic>
-        <p:nvPicPr>
-          <p:cNvPr id="6" name="Рисунок 5">
-            <a:extLst>
-              <a:ext uri="{FF2B5EF4-FFF2-40B4-BE49-F238E27FC236}">
-                <a16:creationId xmlns:a16="http://schemas.microsoft.com/office/drawing/2014/main" id="{7F332726-7FC6-DA2C-D2E5-16F2521C9E54}"/>
-              </a:ext>
-            </a:extLst>
-          </p:cNvPr>
-          <p:cNvPicPr>
-            <a:picLocks noChangeAspect="1"/>
-          </p:cNvPicPr>
-          <p:nvPr/>
-        </p:nvPicPr>
-        <p:blipFill>
-          <a:blip r:embed="rId3">
-            <a:extLst>
-              <a:ext uri="{28A0092B-C50C-407E-A947-70E740481C1C}">
-                <a14:useLocalDpi xmlns:a14="http://schemas.microsoft.com/office/drawing/2010/main" val="0"/>
-              </a:ext>
-            </a:extLst>
-          </a:blip>
-          <a:stretch>
-            <a:fillRect/>
-          </a:stretch>
-        </p:blipFill>
-        <p:spPr>
-          <a:xfrm>
-            <a:off x="383722" y="2291859"/>
-            <a:ext cx="6065522" cy="2543032"/>
-          </a:xfrm>
-          <a:prstGeom prst="rect">
-            <a:avLst/>
-          </a:prstGeom>
-          <a:effectLst>
-            <a:outerShdw blurRad="50800" dist="38100" dir="2700000" algn="tl" rotWithShape="0">
-              <a:prstClr val="black">
-                <a:alpha val="40000"/>
-              </a:prstClr>
-            </a:outerShdw>
-          </a:effectLst>
-        </p:spPr>
-      </p:pic>
-      <p:pic>
-        <p:nvPicPr>
-          <p:cNvPr id="10" name="Рисунок 9">
-            <a:extLst>
-              <a:ext uri="{FF2B5EF4-FFF2-40B4-BE49-F238E27FC236}">
-                <a16:creationId xmlns:a16="http://schemas.microsoft.com/office/drawing/2014/main" id="{645735AF-25F2-088B-85AE-8DD117302323}"/>
-              </a:ext>
-            </a:extLst>
-          </p:cNvPr>
-          <p:cNvPicPr>
-            <a:picLocks noChangeAspect="1"/>
-          </p:cNvPicPr>
-          <p:nvPr/>
-        </p:nvPicPr>
-        <p:blipFill>
-          <a:blip r:embed="rId4">
-            <a:extLst>
-              <a:ext uri="{28A0092B-C50C-407E-A947-70E740481C1C}">
-                <a14:useLocalDpi xmlns:a14="http://schemas.microsoft.com/office/drawing/2010/main" val="0"/>
-              </a:ext>
-            </a:extLst>
-          </a:blip>
-          <a:stretch>
-            <a:fillRect/>
-          </a:stretch>
-        </p:blipFill>
-        <p:spPr>
-          <a:xfrm>
-            <a:off x="4300404" y="4274773"/>
-            <a:ext cx="3446444" cy="1120237"/>
-          </a:xfrm>
-          <a:prstGeom prst="rect">
-            <a:avLst/>
-          </a:prstGeom>
-          <a:effectLst>
-            <a:outerShdw blurRad="50800" dist="38100" dir="2700000" algn="tl" rotWithShape="0">
-              <a:prstClr val="black">
-                <a:alpha val="40000"/>
-              </a:prstClr>
-            </a:outerShdw>
-          </a:effectLst>
-        </p:spPr>
-      </p:pic>
-    </p:spTree>
-    <p:extLst>
-      <p:ext uri="{BB962C8B-B14F-4D97-AF65-F5344CB8AC3E}">
-        <p14:creationId xmlns:p14="http://schemas.microsoft.com/office/powerpoint/2010/main" val="3951106101"/>
-      </p:ext>
-    </p:extLst>
-  </p:cSld>
-  <p:clrMapOvr>
-    <a:masterClrMapping/>
-  </p:clrMapOvr>
-</p:sld>
-</file>
-
-<file path=ppt/slides/slide11.xml><?xml version="1.0" encoding="utf-8"?>
-<p:sld xmlns:a="http://schemas.openxmlformats.org/drawingml/2006/main" xmlns:r="http://schemas.openxmlformats.org/officeDocument/2006/relationships" xmlns:p="http://schemas.openxmlformats.org/presentationml/2006/main">
-  <p:cSld>
-    <p:spTree>
-      <p:nvGrpSpPr>
-        <p:cNvPr id="1" name=""/>
-        <p:cNvGrpSpPr/>
-        <p:nvPr/>
-      </p:nvGrpSpPr>
-      <p:grpSpPr>
-        <a:xfrm>
-          <a:off x="0" y="0"/>
-          <a:ext cx="0" cy="0"/>
-          <a:chOff x="0" y="0"/>
-          <a:chExt cx="0" cy="0"/>
-        </a:xfrm>
-      </p:grpSpPr>
-      <p:sp>
-        <p:nvSpPr>
-          <p:cNvPr id="6" name="Заголовок 1">
-            <a:extLst>
-              <a:ext uri="{FF2B5EF4-FFF2-40B4-BE49-F238E27FC236}">
-                <a16:creationId xmlns:a16="http://schemas.microsoft.com/office/drawing/2014/main" id="{76277648-A197-6531-0425-FA34692EAC27}"/>
-              </a:ext>
-            </a:extLst>
-          </p:cNvPr>
-          <p:cNvSpPr>
-            <a:spLocks noGrp="1"/>
-          </p:cNvSpPr>
-          <p:nvPr>
-            <p:ph type="title"/>
-          </p:nvPr>
-        </p:nvSpPr>
-        <p:spPr>
-          <a:xfrm>
-            <a:off x="334735" y="1180079"/>
-            <a:ext cx="7804703" cy="994172"/>
+            <a:off x="360000" y="1170000"/>
+            <a:ext cx="4715691" cy="994172"/>
           </a:xfrm>
         </p:spPr>
         <p:txBody>
@@ -4556,460 +4223,9 @@
           <a:lstStyle/>
           <a:p>
             <a:r>
-              <a:rPr lang="ru-RU" sz="2700" b="1" u="sng" dirty="0"/>
-              <a:t>Обобщение текста</a:t>
-            </a:r>
-          </a:p>
-        </p:txBody>
-      </p:sp>
-      <p:pic>
-        <p:nvPicPr>
-          <p:cNvPr id="8" name="Объект 7">
-            <a:extLst>
-              <a:ext uri="{FF2B5EF4-FFF2-40B4-BE49-F238E27FC236}">
-                <a16:creationId xmlns:a16="http://schemas.microsoft.com/office/drawing/2014/main" id="{060442F5-D4C6-20AC-D7F6-57897710893C}"/>
-              </a:ext>
-            </a:extLst>
-          </p:cNvPr>
-          <p:cNvPicPr>
-            <a:picLocks noGrp="1" noChangeAspect="1"/>
-          </p:cNvPicPr>
-          <p:nvPr>
-            <p:ph sz="half" idx="1"/>
-          </p:nvPr>
-        </p:nvPicPr>
-        <p:blipFill>
-          <a:blip r:embed="rId2">
-            <a:extLst>
-              <a:ext uri="{28A0092B-C50C-407E-A947-70E740481C1C}">
-                <a14:useLocalDpi xmlns:a14="http://schemas.microsoft.com/office/drawing/2010/main" val="0"/>
-              </a:ext>
-            </a:extLst>
-          </a:blip>
-          <a:stretch>
-            <a:fillRect/>
-          </a:stretch>
-        </p:blipFill>
-        <p:spPr>
-          <a:xfrm>
-            <a:off x="334735" y="2255879"/>
-            <a:ext cx="2482298" cy="2000125"/>
-          </a:xfrm>
-          <a:prstGeom prst="rect">
-            <a:avLst/>
-          </a:prstGeom>
-          <a:effectLst>
-            <a:outerShdw blurRad="50800" dist="38100" dir="2700000" algn="tl" rotWithShape="0">
-              <a:prstClr val="black">
-                <a:alpha val="40000"/>
-              </a:prstClr>
-            </a:outerShdw>
-          </a:effectLst>
-        </p:spPr>
-      </p:pic>
-      <p:pic>
-        <p:nvPicPr>
-          <p:cNvPr id="10" name="Рисунок 9">
-            <a:extLst>
-              <a:ext uri="{FF2B5EF4-FFF2-40B4-BE49-F238E27FC236}">
-                <a16:creationId xmlns:a16="http://schemas.microsoft.com/office/drawing/2014/main" id="{39737559-F0E6-9995-AA97-21BC0D895615}"/>
-              </a:ext>
-            </a:extLst>
-          </p:cNvPr>
-          <p:cNvPicPr>
-            <a:picLocks noChangeAspect="1"/>
-          </p:cNvPicPr>
-          <p:nvPr/>
-        </p:nvPicPr>
-        <p:blipFill>
-          <a:blip r:embed="rId3"/>
-          <a:stretch>
-            <a:fillRect/>
-          </a:stretch>
-        </p:blipFill>
-        <p:spPr>
-          <a:xfrm>
-            <a:off x="2696993" y="2710036"/>
-            <a:ext cx="4880600" cy="2967885"/>
-          </a:xfrm>
-          <a:prstGeom prst="rect">
-            <a:avLst/>
-          </a:prstGeom>
-          <a:effectLst>
-            <a:outerShdw blurRad="50800" dist="38100" dir="2700000" algn="tl" rotWithShape="0">
-              <a:prstClr val="black">
-                <a:alpha val="40000"/>
-              </a:prstClr>
-            </a:outerShdw>
-          </a:effectLst>
-        </p:spPr>
-      </p:pic>
-    </p:spTree>
-    <p:extLst>
-      <p:ext uri="{BB962C8B-B14F-4D97-AF65-F5344CB8AC3E}">
-        <p14:creationId xmlns:p14="http://schemas.microsoft.com/office/powerpoint/2010/main" val="564058936"/>
-      </p:ext>
-    </p:extLst>
-  </p:cSld>
-  <p:clrMapOvr>
-    <a:masterClrMapping/>
-  </p:clrMapOvr>
-</p:sld>
-</file>
-
-<file path=ppt/slides/slide12.xml><?xml version="1.0" encoding="utf-8"?>
-<p:sld xmlns:a="http://schemas.openxmlformats.org/drawingml/2006/main" xmlns:r="http://schemas.openxmlformats.org/officeDocument/2006/relationships" xmlns:p="http://schemas.openxmlformats.org/presentationml/2006/main">
-  <p:cSld>
-    <p:spTree>
-      <p:nvGrpSpPr>
-        <p:cNvPr id="1" name=""/>
-        <p:cNvGrpSpPr/>
-        <p:nvPr/>
-      </p:nvGrpSpPr>
-      <p:grpSpPr>
-        <a:xfrm>
-          <a:off x="0" y="0"/>
-          <a:ext cx="0" cy="0"/>
-          <a:chOff x="0" y="0"/>
-          <a:chExt cx="0" cy="0"/>
-        </a:xfrm>
-      </p:grpSpPr>
-      <p:sp>
-        <p:nvSpPr>
-          <p:cNvPr id="6" name="Заголовок 1">
-            <a:extLst>
-              <a:ext uri="{FF2B5EF4-FFF2-40B4-BE49-F238E27FC236}">
-                <a16:creationId xmlns:a16="http://schemas.microsoft.com/office/drawing/2014/main" id="{76277648-A197-6531-0425-FA34692EAC27}"/>
-              </a:ext>
-            </a:extLst>
-          </p:cNvPr>
-          <p:cNvSpPr>
-            <a:spLocks noGrp="1"/>
-          </p:cNvSpPr>
-          <p:nvPr>
-            <p:ph type="title"/>
-          </p:nvPr>
-        </p:nvSpPr>
-        <p:spPr>
-          <a:xfrm>
-            <a:off x="349433" y="348955"/>
-            <a:ext cx="4314008" cy="994172"/>
-          </a:xfrm>
-        </p:spPr>
-        <p:txBody>
-          <a:bodyPr>
-            <a:normAutofit/>
-          </a:bodyPr>
-          <a:lstStyle/>
-          <a:p>
-            <a:r>
-              <a:rPr lang="ru-RU" sz="2700" b="1" u="sng" dirty="0"/>
-              <a:t>Обобщение текста</a:t>
-            </a:r>
-          </a:p>
-        </p:txBody>
-      </p:sp>
-      <p:sp>
-        <p:nvSpPr>
-          <p:cNvPr id="4" name="Объект 3">
-            <a:extLst>
-              <a:ext uri="{FF2B5EF4-FFF2-40B4-BE49-F238E27FC236}">
-                <a16:creationId xmlns:a16="http://schemas.microsoft.com/office/drawing/2014/main" id="{6FE20B52-975D-25F3-3BC2-29E51C3A9E13}"/>
-              </a:ext>
-            </a:extLst>
-          </p:cNvPr>
-          <p:cNvSpPr>
-            <a:spLocks noGrp="1"/>
-          </p:cNvSpPr>
-          <p:nvPr>
-            <p:ph sz="half" idx="1"/>
-          </p:nvPr>
-        </p:nvSpPr>
-        <p:spPr>
-          <a:xfrm>
-            <a:off x="349431" y="1456509"/>
-            <a:ext cx="4359729" cy="4008970"/>
-          </a:xfrm>
-        </p:spPr>
-        <p:txBody>
-          <a:bodyPr>
-            <a:normAutofit fontScale="85000" lnSpcReduction="10000"/>
-          </a:bodyPr>
-          <a:lstStyle/>
-          <a:p>
-            <a:pPr marL="0" indent="0">
-              <a:lnSpc>
-                <a:spcPct val="150000"/>
-              </a:lnSpc>
-              <a:buNone/>
-            </a:pPr>
-            <a:r>
-              <a:rPr lang="ru-RU" dirty="0">
-                <a:latin typeface="Times New Roman" panose="02020603050405020304" pitchFamily="18" charset="0"/>
-                <a:cs typeface="Times New Roman" panose="02020603050405020304" pitchFamily="18" charset="0"/>
-              </a:rPr>
-              <a:t>Алгоритм представляет собой следующее</a:t>
-            </a:r>
-            <a:r>
-              <a:rPr lang="en-US" dirty="0">
-                <a:latin typeface="Times New Roman" panose="02020603050405020304" pitchFamily="18" charset="0"/>
-                <a:cs typeface="Times New Roman" panose="02020603050405020304" pitchFamily="18" charset="0"/>
-              </a:rPr>
-              <a:t>:</a:t>
-            </a:r>
-            <a:endParaRPr lang="ru-RU" dirty="0">
-              <a:latin typeface="Times New Roman" panose="02020603050405020304" pitchFamily="18" charset="0"/>
-              <a:cs typeface="Times New Roman" panose="02020603050405020304" pitchFamily="18" charset="0"/>
-            </a:endParaRPr>
-          </a:p>
-          <a:p>
-            <a:pPr marL="385763" indent="-385763">
-              <a:lnSpc>
-                <a:spcPct val="150000"/>
-              </a:lnSpc>
-              <a:buFont typeface="+mj-lt"/>
-              <a:buAutoNum type="arabicPeriod"/>
-            </a:pPr>
-            <a:r>
-              <a:rPr lang="ru-RU" dirty="0">
-                <a:latin typeface="Times New Roman" panose="02020603050405020304" pitchFamily="18" charset="0"/>
-                <a:cs typeface="Times New Roman" panose="02020603050405020304" pitchFamily="18" charset="0"/>
-              </a:rPr>
-              <a:t>Выборка и обработка выделенного пользователем текста.</a:t>
-            </a:r>
-          </a:p>
-          <a:p>
-            <a:pPr marL="385763" indent="-385763">
-              <a:lnSpc>
-                <a:spcPct val="150000"/>
-              </a:lnSpc>
-              <a:buFont typeface="+mj-lt"/>
-              <a:buAutoNum type="arabicPeriod"/>
-            </a:pPr>
-            <a:r>
-              <a:rPr lang="ru-RU" dirty="0">
-                <a:latin typeface="Times New Roman" panose="02020603050405020304" pitchFamily="18" charset="0"/>
-                <a:cs typeface="Times New Roman" panose="02020603050405020304" pitchFamily="18" charset="0"/>
-              </a:rPr>
-              <a:t>Передача серверу текста.</a:t>
-            </a:r>
-          </a:p>
-          <a:p>
-            <a:pPr marL="385763" indent="-385763">
-              <a:lnSpc>
-                <a:spcPct val="150000"/>
-              </a:lnSpc>
-              <a:buFont typeface="+mj-lt"/>
-              <a:buAutoNum type="arabicPeriod"/>
-            </a:pPr>
-            <a:r>
-              <a:rPr lang="ru-RU" dirty="0">
-                <a:latin typeface="Times New Roman" panose="02020603050405020304" pitchFamily="18" charset="0"/>
-                <a:cs typeface="Times New Roman" panose="02020603050405020304" pitchFamily="18" charset="0"/>
-              </a:rPr>
-              <a:t>Сервер формирует запрос.</a:t>
-            </a:r>
-          </a:p>
-          <a:p>
-            <a:pPr marL="385763" indent="-385763">
-              <a:lnSpc>
-                <a:spcPct val="150000"/>
-              </a:lnSpc>
-              <a:buFont typeface="+mj-lt"/>
-              <a:buAutoNum type="arabicPeriod"/>
-            </a:pPr>
-            <a:r>
-              <a:rPr lang="ru-RU" dirty="0">
-                <a:latin typeface="Times New Roman" panose="02020603050405020304" pitchFamily="18" charset="0"/>
-                <a:cs typeface="Times New Roman" panose="02020603050405020304" pitchFamily="18" charset="0"/>
-              </a:rPr>
-              <a:t>Отправка</a:t>
-            </a:r>
-            <a:r>
-              <a:rPr lang="en-US" dirty="0">
-                <a:latin typeface="Times New Roman" panose="02020603050405020304" pitchFamily="18" charset="0"/>
-                <a:cs typeface="Times New Roman" panose="02020603050405020304" pitchFamily="18" charset="0"/>
-              </a:rPr>
-              <a:t> </a:t>
-            </a:r>
-            <a:r>
-              <a:rPr lang="ru-RU" dirty="0">
-                <a:latin typeface="Times New Roman" panose="02020603050405020304" pitchFamily="18" charset="0"/>
-                <a:cs typeface="Times New Roman" panose="02020603050405020304" pitchFamily="18" charset="0"/>
-              </a:rPr>
-              <a:t>запроса к </a:t>
-            </a:r>
-            <a:r>
-              <a:rPr lang="en-US" dirty="0">
-                <a:latin typeface="Times New Roman" panose="02020603050405020304" pitchFamily="18" charset="0"/>
-                <a:cs typeface="Times New Roman" panose="02020603050405020304" pitchFamily="18" charset="0"/>
-              </a:rPr>
-              <a:t>API </a:t>
-            </a:r>
-            <a:r>
-              <a:rPr lang="ru-RU" dirty="0">
-                <a:latin typeface="Times New Roman" panose="02020603050405020304" pitchFamily="18" charset="0"/>
-                <a:cs typeface="Times New Roman" panose="02020603050405020304" pitchFamily="18" charset="0"/>
-              </a:rPr>
-              <a:t>ИИ</a:t>
-            </a:r>
-            <a:r>
-              <a:rPr lang="en-US" dirty="0">
-                <a:latin typeface="Times New Roman" panose="02020603050405020304" pitchFamily="18" charset="0"/>
-                <a:cs typeface="Times New Roman" panose="02020603050405020304" pitchFamily="18" charset="0"/>
-              </a:rPr>
-              <a:t>.</a:t>
-            </a:r>
-            <a:endParaRPr lang="ru-RU" dirty="0">
-              <a:latin typeface="Times New Roman" panose="02020603050405020304" pitchFamily="18" charset="0"/>
-              <a:cs typeface="Times New Roman" panose="02020603050405020304" pitchFamily="18" charset="0"/>
-            </a:endParaRPr>
-          </a:p>
-          <a:p>
-            <a:pPr marL="385763" indent="-385763">
-              <a:lnSpc>
-                <a:spcPct val="150000"/>
-              </a:lnSpc>
-              <a:buFont typeface="+mj-lt"/>
-              <a:buAutoNum type="arabicPeriod"/>
-            </a:pPr>
-            <a:r>
-              <a:rPr lang="ru-RU" dirty="0">
-                <a:latin typeface="Times New Roman" panose="02020603050405020304" pitchFamily="18" charset="0"/>
-                <a:cs typeface="Times New Roman" panose="02020603050405020304" pitchFamily="18" charset="0"/>
-              </a:rPr>
-              <a:t>Получение и обработка ответа сервером.</a:t>
-            </a:r>
-          </a:p>
-          <a:p>
-            <a:pPr marL="385763" indent="-385763">
-              <a:lnSpc>
-                <a:spcPct val="150000"/>
-              </a:lnSpc>
-              <a:buFont typeface="+mj-lt"/>
-              <a:buAutoNum type="arabicPeriod"/>
-            </a:pPr>
-            <a:r>
-              <a:rPr lang="ru-RU" dirty="0">
-                <a:latin typeface="Times New Roman" panose="02020603050405020304" pitchFamily="18" charset="0"/>
-                <a:cs typeface="Times New Roman" panose="02020603050405020304" pitchFamily="18" charset="0"/>
-              </a:rPr>
-              <a:t>Передача клиенту</a:t>
-            </a:r>
-            <a:r>
-              <a:rPr lang="en-US" dirty="0">
-                <a:latin typeface="Times New Roman" panose="02020603050405020304" pitchFamily="18" charset="0"/>
-                <a:cs typeface="Times New Roman" panose="02020603050405020304" pitchFamily="18" charset="0"/>
-              </a:rPr>
-              <a:t>.</a:t>
-            </a:r>
-          </a:p>
-          <a:p>
-            <a:pPr marL="0" indent="0">
-              <a:buNone/>
-            </a:pPr>
-            <a:endParaRPr lang="ru-RU" dirty="0"/>
-          </a:p>
-        </p:txBody>
-      </p:sp>
-      <p:pic>
-        <p:nvPicPr>
-          <p:cNvPr id="3" name="Объект 2">
-            <a:extLst>
-              <a:ext uri="{FF2B5EF4-FFF2-40B4-BE49-F238E27FC236}">
-                <a16:creationId xmlns:a16="http://schemas.microsoft.com/office/drawing/2014/main" id="{75196021-CC2A-B5A2-0DE7-DB2E2EA67EBE}"/>
-              </a:ext>
-            </a:extLst>
-          </p:cNvPr>
-          <p:cNvPicPr>
-            <a:picLocks noGrp="1" noChangeAspect="1"/>
-          </p:cNvPicPr>
-          <p:nvPr>
-            <p:ph sz="half" idx="2"/>
-          </p:nvPr>
-        </p:nvPicPr>
-        <p:blipFill>
-          <a:blip r:embed="rId2">
-            <a:extLst>
-              <a:ext uri="{28A0092B-C50C-407E-A947-70E740481C1C}">
-                <a14:useLocalDpi xmlns:a14="http://schemas.microsoft.com/office/drawing/2010/main" val="0"/>
-              </a:ext>
-            </a:extLst>
-          </a:blip>
-          <a:stretch>
-            <a:fillRect/>
-          </a:stretch>
-        </p:blipFill>
-        <p:spPr>
-          <a:xfrm>
-            <a:off x="4912131" y="348955"/>
-            <a:ext cx="1658486" cy="5497204"/>
-          </a:xfrm>
-        </p:spPr>
-      </p:pic>
-    </p:spTree>
-    <p:extLst>
-      <p:ext uri="{BB962C8B-B14F-4D97-AF65-F5344CB8AC3E}">
-        <p14:creationId xmlns:p14="http://schemas.microsoft.com/office/powerpoint/2010/main" val="3592267970"/>
-      </p:ext>
-    </p:extLst>
-  </p:cSld>
-  <p:clrMapOvr>
-    <a:masterClrMapping/>
-  </p:clrMapOvr>
-</p:sld>
-</file>
-
-<file path=ppt/slides/slide13.xml><?xml version="1.0" encoding="utf-8"?>
-<p:sld xmlns:a="http://schemas.openxmlformats.org/drawingml/2006/main" xmlns:r="http://schemas.openxmlformats.org/officeDocument/2006/relationships" xmlns:p="http://schemas.openxmlformats.org/presentationml/2006/main">
-  <p:cSld>
-    <p:spTree>
-      <p:nvGrpSpPr>
-        <p:cNvPr id="1" name=""/>
-        <p:cNvGrpSpPr/>
-        <p:nvPr/>
-      </p:nvGrpSpPr>
-      <p:grpSpPr>
-        <a:xfrm>
-          <a:off x="0" y="0"/>
-          <a:ext cx="0" cy="0"/>
-          <a:chOff x="0" y="0"/>
-          <a:chExt cx="0" cy="0"/>
-        </a:xfrm>
-      </p:grpSpPr>
-      <p:sp>
-        <p:nvSpPr>
-          <p:cNvPr id="2" name="Заголовок 1">
-            <a:extLst>
-              <a:ext uri="{FF2B5EF4-FFF2-40B4-BE49-F238E27FC236}">
-                <a16:creationId xmlns:a16="http://schemas.microsoft.com/office/drawing/2014/main" id="{2C64B6FC-9AA1-371B-6B3C-18F406082223}"/>
-              </a:ext>
-            </a:extLst>
-          </p:cNvPr>
-          <p:cNvSpPr>
-            <a:spLocks noGrp="1"/>
-          </p:cNvSpPr>
-          <p:nvPr>
-            <p:ph type="title"/>
-          </p:nvPr>
-        </p:nvSpPr>
-        <p:spPr>
-          <a:xfrm>
-            <a:off x="344534" y="1184979"/>
-            <a:ext cx="4715691" cy="994172"/>
-          </a:xfrm>
-        </p:spPr>
-        <p:txBody>
-          <a:bodyPr>
-            <a:normAutofit fontScale="90000"/>
-          </a:bodyPr>
-          <a:lstStyle/>
-          <a:p>
-            <a:r>
-              <a:rPr lang="ru-RU" b="1" u="sng" dirty="0"/>
+              <a:rPr lang="ru-RU" sz="2800" b="1" u="sng" dirty="0"/>
               <a:t>Определение слова</a:t>
             </a:r>
-            <a:endParaRPr lang="ru-RU" dirty="0"/>
           </a:p>
         </p:txBody>
       </p:sp>
@@ -5245,7 +4461,7 @@
 </p:sld>
 </file>
 
-<file path=ppt/slides/slide14.xml><?xml version="1.0" encoding="utf-8"?>
+<file path=ppt/slides/slide11.xml><?xml version="1.0" encoding="utf-8"?>
 <p:sld xmlns:a="http://schemas.openxmlformats.org/drawingml/2006/main" xmlns:r="http://schemas.openxmlformats.org/officeDocument/2006/relationships" xmlns:p="http://schemas.openxmlformats.org/presentationml/2006/main">
   <p:cSld>
     <p:spTree>
@@ -5280,26 +4496,26 @@
         </p:nvSpPr>
         <p:spPr>
           <a:xfrm>
-            <a:off x="476794" y="1126671"/>
+            <a:off x="360000" y="1170000"/>
             <a:ext cx="4118719" cy="994172"/>
           </a:xfrm>
         </p:spPr>
         <p:txBody>
           <a:bodyPr>
-            <a:normAutofit fontScale="90000"/>
+            <a:normAutofit/>
           </a:bodyPr>
           <a:lstStyle/>
           <a:p>
             <a:r>
-              <a:rPr lang="ru-RU" b="1" u="sng" dirty="0"/>
+              <a:rPr lang="ru-RU" sz="2800" b="1" u="sng" dirty="0"/>
               <a:t>Трекинг</a:t>
             </a:r>
             <a:r>
-              <a:rPr lang="ru-RU" b="1" i="1" u="sng" dirty="0"/>
+              <a:rPr lang="ru-RU" sz="2800" b="1" i="1" u="sng" dirty="0"/>
               <a:t> </a:t>
             </a:r>
             <a:r>
-              <a:rPr lang="ru-RU" b="1" u="sng" dirty="0"/>
+              <a:rPr lang="ru-RU" sz="2800" b="1" u="sng" dirty="0"/>
               <a:t>времени</a:t>
             </a:r>
           </a:p>
@@ -5323,7 +4539,7 @@
         </p:nvSpPr>
         <p:spPr>
           <a:xfrm>
-            <a:off x="476794" y="2226469"/>
+            <a:off x="421456" y="2424496"/>
             <a:ext cx="4494973" cy="3263504"/>
           </a:xfrm>
         </p:spPr>
@@ -5466,8 +4682,8 @@
         </p:nvSpPr>
         <p:spPr>
           <a:xfrm>
-            <a:off x="334736" y="1170283"/>
-            <a:ext cx="7886700" cy="715100"/>
+            <a:off x="360000" y="1170283"/>
+            <a:ext cx="7920000" cy="715100"/>
           </a:xfrm>
         </p:spPr>
         <p:txBody>
@@ -5477,7 +4693,7 @@
           <a:lstStyle/>
           <a:p>
             <a:r>
-              <a:rPr lang="ru-RU" b="1" u="sng" dirty="0"/>
+              <a:rPr lang="ru-RU" sz="2800" b="1" u="sng" dirty="0"/>
               <a:t>Цель</a:t>
             </a:r>
             <a:r>
@@ -5485,7 +4701,7 @@
               <a:t> </a:t>
             </a:r>
             <a:r>
-              <a:rPr lang="ru-RU" b="1" u="sng" dirty="0"/>
+              <a:rPr lang="ru-RU" sz="2800" b="1" u="sng" dirty="0"/>
               <a:t>работы</a:t>
             </a:r>
           </a:p>
@@ -5509,7 +4725,7 @@
         </p:nvSpPr>
         <p:spPr>
           <a:xfrm>
-            <a:off x="334736" y="1948747"/>
+            <a:off x="360000" y="1948747"/>
             <a:ext cx="7886700" cy="1028699"/>
           </a:xfrm>
         </p:spPr>
@@ -5551,7 +4767,7 @@
         </p:nvSpPr>
         <p:spPr>
           <a:xfrm>
-            <a:off x="334736" y="2890476"/>
+            <a:off x="393300" y="2915573"/>
             <a:ext cx="7886700" cy="648528"/>
           </a:xfrm>
           <a:prstGeom prst="rect">
@@ -5583,7 +4799,7 @@
           </a:lstStyle>
           <a:p>
             <a:r>
-              <a:rPr lang="ru-RU" sz="3300" b="1" u="sng" dirty="0"/>
+              <a:rPr lang="ru-RU" sz="2800" b="1" u="sng" spc="-50" dirty="0"/>
               <a:t>Задачи</a:t>
             </a:r>
           </a:p>
@@ -5605,8 +4821,8 @@
         </p:nvSpPr>
         <p:spPr>
           <a:xfrm>
-            <a:off x="334736" y="3539005"/>
-            <a:ext cx="7886700" cy="2060972"/>
+            <a:off x="426600" y="3548252"/>
+            <a:ext cx="7886700" cy="2848732"/>
           </a:xfrm>
           <a:prstGeom prst="rect">
             <a:avLst/>
@@ -5614,7 +4830,7 @@
         </p:spPr>
         <p:txBody>
           <a:bodyPr vert="horz" lIns="68580" tIns="34290" rIns="68580" bIns="34290" rtlCol="0">
-            <a:normAutofit lnSpcReduction="10000"/>
+            <a:normAutofit/>
           </a:bodyPr>
           <a:lstStyle>
             <a:lvl1pPr marL="228600" indent="-228600" algn="l" defTabSz="914400" rtl="0" eaLnBrk="1" latinLnBrk="0" hangingPunct="1">
@@ -5787,21 +5003,21 @@
               </a:lnSpc>
             </a:pPr>
             <a:r>
-              <a:rPr lang="ru-RU" sz="1350" dirty="0">
+              <a:rPr lang="ru-RU" sz="1800" dirty="0">
                 <a:latin typeface="Times New Roman" panose="02020603050405020304" pitchFamily="18" charset="0"/>
                 <a:cs typeface="Times New Roman" panose="02020603050405020304" pitchFamily="18" charset="0"/>
               </a:rPr>
               <a:t>Разработка программного обеспечения</a:t>
             </a:r>
             <a:r>
-              <a:rPr lang="en-US" sz="1350" dirty="0">
+              <a:rPr lang="en-US" sz="1800" dirty="0">
                 <a:latin typeface="Times New Roman" panose="02020603050405020304" pitchFamily="18" charset="0"/>
                 <a:cs typeface="Times New Roman" panose="02020603050405020304" pitchFamily="18" charset="0"/>
               </a:rPr>
               <a:t> </a:t>
             </a:r>
             <a:r>
-              <a:rPr lang="ru-RU" sz="1350" dirty="0">
+              <a:rPr lang="ru-RU" sz="1800" dirty="0">
                 <a:latin typeface="Times New Roman" panose="02020603050405020304" pitchFamily="18" charset="0"/>
                 <a:cs typeface="Times New Roman" panose="02020603050405020304" pitchFamily="18" charset="0"/>
               </a:rPr>
@@ -5815,7 +5031,7 @@
               </a:lnSpc>
             </a:pPr>
             <a:r>
-              <a:rPr lang="ru-RU" sz="1350" dirty="0">
+              <a:rPr lang="ru-RU" sz="1800" dirty="0">
                 <a:latin typeface="Times New Roman" panose="02020603050405020304" pitchFamily="18" charset="0"/>
                 <a:cs typeface="Times New Roman" panose="02020603050405020304" pitchFamily="18" charset="0"/>
               </a:rPr>
@@ -5829,7 +5045,7 @@
               </a:lnSpc>
             </a:pPr>
             <a:r>
-              <a:rPr lang="ru-RU" sz="1350" dirty="0">
+              <a:rPr lang="ru-RU" sz="1800" dirty="0">
                 <a:latin typeface="Times New Roman" panose="02020603050405020304" pitchFamily="18" charset="0"/>
                 <a:cs typeface="Times New Roman" panose="02020603050405020304" pitchFamily="18" charset="0"/>
               </a:rPr>
@@ -5843,7 +5059,7 @@
               </a:lnSpc>
             </a:pPr>
             <a:r>
-              <a:rPr lang="ru-RU" sz="1350" dirty="0">
+              <a:rPr lang="ru-RU" sz="1800" dirty="0">
                 <a:latin typeface="Times New Roman" panose="02020603050405020304" pitchFamily="18" charset="0"/>
                 <a:cs typeface="Times New Roman" panose="02020603050405020304" pitchFamily="18" charset="0"/>
               </a:rPr>
@@ -5857,7 +5073,7 @@
               </a:lnSpc>
             </a:pPr>
             <a:r>
-              <a:rPr lang="ru-RU" sz="1350" dirty="0">
+              <a:rPr lang="ru-RU" sz="1800" dirty="0">
                 <a:latin typeface="Times New Roman" panose="02020603050405020304" pitchFamily="18" charset="0"/>
                 <a:cs typeface="Times New Roman" panose="02020603050405020304" pitchFamily="18" charset="0"/>
               </a:rPr>
@@ -5914,16 +5130,18 @@
         </p:nvSpPr>
         <p:spPr>
           <a:xfrm>
-            <a:off x="338981" y="1180555"/>
+            <a:off x="360000" y="1170000"/>
             <a:ext cx="7269480" cy="994172"/>
           </a:xfrm>
         </p:spPr>
         <p:txBody>
-          <a:bodyPr/>
+          <a:bodyPr>
+            <a:normAutofit/>
+          </a:bodyPr>
           <a:lstStyle/>
           <a:p>
             <a:r>
-              <a:rPr lang="ru-RU" b="1" u="sng" dirty="0"/>
+              <a:rPr lang="ru-RU" sz="2800" b="1" u="sng" dirty="0"/>
               <a:t>Функции системы</a:t>
             </a:r>
           </a:p>
@@ -5947,13 +5165,13 @@
         </p:nvSpPr>
         <p:spPr>
           <a:xfrm>
-            <a:off x="338981" y="2277836"/>
-            <a:ext cx="6446520" cy="3263503"/>
+            <a:off x="360000" y="2303962"/>
+            <a:ext cx="7290499" cy="3574324"/>
           </a:xfrm>
         </p:spPr>
         <p:txBody>
           <a:bodyPr>
-            <a:normAutofit fontScale="92500" lnSpcReduction="10000"/>
+            <a:noAutofit/>
           </a:bodyPr>
           <a:lstStyle/>
           <a:p>
@@ -5963,7 +5181,7 @@
               </a:lnSpc>
             </a:pPr>
             <a:r>
-              <a:rPr lang="ru-RU" sz="1800" dirty="0">
+              <a:rPr lang="ru-RU" dirty="0">
                 <a:latin typeface="Times New Roman" panose="02020603050405020304" pitchFamily="18" charset="0"/>
                 <a:cs typeface="Times New Roman" panose="02020603050405020304" pitchFamily="18" charset="0"/>
               </a:rPr>
@@ -5977,7 +5195,7 @@
               </a:lnSpc>
             </a:pPr>
             <a:r>
-              <a:rPr lang="ru-RU" sz="1800" dirty="0">
+              <a:rPr lang="ru-RU" dirty="0">
                 <a:latin typeface="Times New Roman" panose="02020603050405020304" pitchFamily="18" charset="0"/>
                 <a:cs typeface="Times New Roman" panose="02020603050405020304" pitchFamily="18" charset="0"/>
               </a:rPr>
@@ -5991,7 +5209,7 @@
               </a:lnSpc>
             </a:pPr>
             <a:r>
-              <a:rPr lang="ru-RU" sz="1800" dirty="0">
+              <a:rPr lang="ru-RU" dirty="0">
                 <a:latin typeface="Times New Roman" panose="02020603050405020304" pitchFamily="18" charset="0"/>
                 <a:cs typeface="Times New Roman" panose="02020603050405020304" pitchFamily="18" charset="0"/>
               </a:rPr>
@@ -6005,7 +5223,7 @@
               </a:lnSpc>
             </a:pPr>
             <a:r>
-              <a:rPr lang="ru-RU" sz="1800" dirty="0">
+              <a:rPr lang="ru-RU" dirty="0">
                 <a:latin typeface="Times New Roman" panose="02020603050405020304" pitchFamily="18" charset="0"/>
                 <a:cs typeface="Times New Roman" panose="02020603050405020304" pitchFamily="18" charset="0"/>
               </a:rPr>
@@ -6019,14 +5237,14 @@
               </a:lnSpc>
             </a:pPr>
             <a:r>
-              <a:rPr lang="ru-RU" sz="1800" dirty="0">
+              <a:rPr lang="ru-RU" dirty="0">
                 <a:latin typeface="Times New Roman" panose="02020603050405020304" pitchFamily="18" charset="0"/>
                 <a:cs typeface="Times New Roman" panose="02020603050405020304" pitchFamily="18" charset="0"/>
               </a:rPr>
               <a:t>обобщение текста</a:t>
             </a:r>
             <a:r>
-              <a:rPr lang="en-US" sz="1800" dirty="0">
+              <a:rPr lang="en-US" dirty="0">
                 <a:latin typeface="Times New Roman" panose="02020603050405020304" pitchFamily="18" charset="0"/>
                 <a:cs typeface="Times New Roman" panose="02020603050405020304" pitchFamily="18" charset="0"/>
               </a:rPr>
@@ -6040,7 +5258,7 @@
               </a:lnSpc>
             </a:pPr>
             <a:r>
-              <a:rPr lang="ru-RU" sz="1800" dirty="0">
+              <a:rPr lang="ru-RU" dirty="0">
                 <a:latin typeface="Times New Roman" panose="02020603050405020304" pitchFamily="18" charset="0"/>
                 <a:cs typeface="Times New Roman" panose="02020603050405020304" pitchFamily="18" charset="0"/>
               </a:rPr>
@@ -6097,7 +5315,7 @@
         </p:nvSpPr>
         <p:spPr>
           <a:xfrm>
-            <a:off x="329184" y="1126829"/>
+            <a:off x="360000" y="1170000"/>
             <a:ext cx="7269480" cy="994172"/>
           </a:xfrm>
         </p:spPr>
@@ -6108,7 +5326,7 @@
           <a:lstStyle/>
           <a:p>
             <a:r>
-              <a:rPr lang="ru-RU" sz="2100" b="1" u="sng" dirty="0"/>
+              <a:rPr lang="ru-RU" sz="2800" b="1" u="sng" dirty="0"/>
               <a:t>Таблица результатов сравнительного анализа аналогов и системы</a:t>
             </a:r>
           </a:p>
@@ -6130,14 +5348,14 @@
             <p:ph idx="1"/>
             <p:extLst>
               <p:ext uri="{D42A27DB-BD31-4B8C-83A1-F6EECF244321}">
-                <p14:modId xmlns:p14="http://schemas.microsoft.com/office/powerpoint/2010/main" val="3753408370"/>
+                <p14:modId xmlns:p14="http://schemas.microsoft.com/office/powerpoint/2010/main" val="1998424720"/>
               </p:ext>
             </p:extLst>
           </p:nvPr>
         </p:nvGraphicFramePr>
         <p:xfrm>
-          <a:off x="383721" y="2125265"/>
-          <a:ext cx="7649935" cy="3961284"/>
+          <a:off x="360000" y="2353865"/>
+          <a:ext cx="7649935" cy="3605907"/>
         </p:xfrm>
         <a:graphic>
           <a:graphicData uri="http://schemas.openxmlformats.org/drawingml/2006/table">
@@ -6194,15 +5412,18 @@
                         </a:lnSpc>
                       </a:pPr>
                       <a:r>
-                        <a:rPr lang="ru-RU" sz="1400" b="1" kern="150" dirty="0">
+                        <a:rPr lang="ru-RU" sz="1200" b="1" kern="150" dirty="0">
                           <a:effectLst/>
+                          <a:latin typeface="Times New Roman" panose="02020603050405020304" pitchFamily="18" charset="0"/>
+                          <a:cs typeface="Times New Roman" panose="02020603050405020304" pitchFamily="18" charset="0"/>
                         </a:rPr>
                         <a:t>Название программного продукта</a:t>
                       </a:r>
-                      <a:endParaRPr lang="ru-RU" sz="1400" b="1" kern="150" dirty="0">
+                      <a:endParaRPr lang="ru-RU" sz="1200" b="1" kern="150" dirty="0">
                         <a:effectLst/>
                         <a:latin typeface="Times New Roman" panose="02020603050405020304" pitchFamily="18" charset="0"/>
                         <a:ea typeface="+mn-ea"/>
+                        <a:cs typeface="Times New Roman" panose="02020603050405020304" pitchFamily="18" charset="0"/>
                       </a:endParaRPr>
                     </a:p>
                   </a:txBody>
@@ -6219,15 +5440,18 @@
                         </a:lnSpc>
                       </a:pPr>
                       <a:r>
-                        <a:rPr lang="ru-RU" sz="1400" b="1" kern="150" dirty="0">
+                        <a:rPr lang="ru-RU" sz="1200" b="1" kern="150" dirty="0">
                           <a:effectLst/>
+                          <a:latin typeface="Times New Roman" panose="02020603050405020304" pitchFamily="18" charset="0"/>
+                          <a:cs typeface="Times New Roman" panose="02020603050405020304" pitchFamily="18" charset="0"/>
                         </a:rPr>
                         <a:t>Calibre</a:t>
                       </a:r>
-                      <a:endParaRPr lang="ru-RU" sz="1400" b="1" kern="150" dirty="0">
+                      <a:endParaRPr lang="ru-RU" sz="1200" b="1" kern="150" dirty="0">
                         <a:effectLst/>
                         <a:latin typeface="Times New Roman" panose="02020603050405020304" pitchFamily="18" charset="0"/>
                         <a:ea typeface="+mn-ea"/>
+                        <a:cs typeface="Times New Roman" panose="02020603050405020304" pitchFamily="18" charset="0"/>
                       </a:endParaRPr>
                     </a:p>
                   </a:txBody>
@@ -6244,15 +5468,18 @@
                         </a:lnSpc>
                       </a:pPr>
                       <a:r>
-                        <a:rPr lang="en-US" sz="1400" b="1" kern="150" dirty="0">
+                        <a:rPr lang="en-US" sz="1200" b="1" kern="150" dirty="0">
                           <a:effectLst/>
+                          <a:latin typeface="Times New Roman" panose="02020603050405020304" pitchFamily="18" charset="0"/>
+                          <a:cs typeface="Times New Roman" panose="02020603050405020304" pitchFamily="18" charset="0"/>
                         </a:rPr>
                         <a:t>Kavita</a:t>
                       </a:r>
-                      <a:endParaRPr lang="ru-RU" sz="1400" b="1" kern="150" dirty="0">
+                      <a:endParaRPr lang="ru-RU" sz="1200" b="1" kern="150" dirty="0">
                         <a:effectLst/>
                         <a:latin typeface="Times New Roman" panose="02020603050405020304" pitchFamily="18" charset="0"/>
                         <a:ea typeface="+mn-ea"/>
+                        <a:cs typeface="Times New Roman" panose="02020603050405020304" pitchFamily="18" charset="0"/>
                       </a:endParaRPr>
                     </a:p>
                   </a:txBody>
@@ -6269,15 +5496,18 @@
                         </a:lnSpc>
                       </a:pPr>
                       <a:r>
-                        <a:rPr lang="en-US" sz="1400" b="1" kern="150" dirty="0">
+                        <a:rPr lang="en-US" sz="1200" b="1" kern="150" dirty="0">
                           <a:effectLst/>
+                          <a:latin typeface="Times New Roman" panose="02020603050405020304" pitchFamily="18" charset="0"/>
+                          <a:cs typeface="Times New Roman" panose="02020603050405020304" pitchFamily="18" charset="0"/>
                         </a:rPr>
                         <a:t>Koodo</a:t>
                       </a:r>
-                      <a:endParaRPr lang="ru-RU" sz="1400" b="1" kern="150" dirty="0">
+                      <a:endParaRPr lang="ru-RU" sz="1200" b="1" kern="150" dirty="0">
                         <a:effectLst/>
                         <a:latin typeface="Times New Roman" panose="02020603050405020304" pitchFamily="18" charset="0"/>
                         <a:ea typeface="+mn-ea"/>
+                        <a:cs typeface="Times New Roman" panose="02020603050405020304" pitchFamily="18" charset="0"/>
                       </a:endParaRPr>
                     </a:p>
                   </a:txBody>
@@ -6294,15 +5524,18 @@
                         </a:lnSpc>
                       </a:pPr>
                       <a:r>
-                        <a:rPr lang="ru-RU" sz="1400" b="1" kern="150" dirty="0">
+                        <a:rPr lang="ru-RU" sz="1200" b="1" kern="150" dirty="0">
                           <a:effectLst/>
+                          <a:latin typeface="Times New Roman" panose="02020603050405020304" pitchFamily="18" charset="0"/>
+                          <a:cs typeface="Times New Roman" panose="02020603050405020304" pitchFamily="18" charset="0"/>
                         </a:rPr>
                         <a:t>Разработанный программный продукт</a:t>
                       </a:r>
-                      <a:endParaRPr lang="ru-RU" sz="1400" b="1" kern="150" dirty="0">
+                      <a:endParaRPr lang="ru-RU" sz="1200" b="1" kern="150" dirty="0">
                         <a:effectLst/>
                         <a:latin typeface="Times New Roman" panose="02020603050405020304" pitchFamily="18" charset="0"/>
                         <a:ea typeface="+mn-ea"/>
+                        <a:cs typeface="Times New Roman" panose="02020603050405020304" pitchFamily="18" charset="0"/>
                       </a:endParaRPr>
                     </a:p>
                   </a:txBody>
@@ -6326,15 +5559,18 @@
                         </a:lnSpc>
                       </a:pPr>
                       <a:r>
-                        <a:rPr lang="ru-RU" sz="1400" b="1" kern="150" dirty="0">
+                        <a:rPr lang="ru-RU" sz="1200" b="1" kern="150" dirty="0">
                           <a:effectLst/>
+                          <a:latin typeface="Times New Roman" panose="02020603050405020304" pitchFamily="18" charset="0"/>
+                          <a:cs typeface="Times New Roman" panose="02020603050405020304" pitchFamily="18" charset="0"/>
                         </a:rPr>
                         <a:t>Многопользовательская система</a:t>
                       </a:r>
-                      <a:endParaRPr lang="ru-RU" sz="1400" b="1" kern="150" dirty="0">
+                      <a:endParaRPr lang="ru-RU" sz="1200" b="1" kern="150" dirty="0">
                         <a:effectLst/>
                         <a:latin typeface="Times New Roman" panose="02020603050405020304" pitchFamily="18" charset="0"/>
                         <a:ea typeface="+mn-ea"/>
+                        <a:cs typeface="Times New Roman" panose="02020603050405020304" pitchFamily="18" charset="0"/>
                       </a:endParaRPr>
                     </a:p>
                   </a:txBody>
@@ -6351,15 +5587,18 @@
                         </a:lnSpc>
                       </a:pPr>
                       <a:r>
-                        <a:rPr lang="ru-RU" sz="1400" kern="150" dirty="0">
+                        <a:rPr lang="ru-RU" sz="1200" kern="150" dirty="0">
                           <a:effectLst/>
+                          <a:latin typeface="Times New Roman" panose="02020603050405020304" pitchFamily="18" charset="0"/>
+                          <a:cs typeface="Times New Roman" panose="02020603050405020304" pitchFamily="18" charset="0"/>
                         </a:rPr>
                         <a:t>-</a:t>
                       </a:r>
-                      <a:endParaRPr lang="ru-RU" sz="1400" kern="150" dirty="0">
+                      <a:endParaRPr lang="ru-RU" sz="1200" kern="150" dirty="0">
                         <a:effectLst/>
                         <a:latin typeface="Times New Roman" panose="02020603050405020304" pitchFamily="18" charset="0"/>
                         <a:ea typeface="+mn-ea"/>
+                        <a:cs typeface="Times New Roman" panose="02020603050405020304" pitchFamily="18" charset="0"/>
                       </a:endParaRPr>
                     </a:p>
                   </a:txBody>
@@ -6376,15 +5615,18 @@
                         </a:lnSpc>
                       </a:pPr>
                       <a:r>
-                        <a:rPr lang="ru-RU" sz="1400" kern="150">
+                        <a:rPr lang="ru-RU" sz="1200" kern="150">
                           <a:effectLst/>
+                          <a:latin typeface="Times New Roman" panose="02020603050405020304" pitchFamily="18" charset="0"/>
+                          <a:cs typeface="Times New Roman" panose="02020603050405020304" pitchFamily="18" charset="0"/>
                         </a:rPr>
                         <a:t>+</a:t>
                       </a:r>
-                      <a:endParaRPr lang="ru-RU" sz="1400" kern="150">
+                      <a:endParaRPr lang="ru-RU" sz="1200" kern="150">
                         <a:effectLst/>
                         <a:latin typeface="Times New Roman" panose="02020603050405020304" pitchFamily="18" charset="0"/>
                         <a:ea typeface="+mn-ea"/>
+                        <a:cs typeface="Times New Roman" panose="02020603050405020304" pitchFamily="18" charset="0"/>
                       </a:endParaRPr>
                     </a:p>
                   </a:txBody>
@@ -6401,15 +5643,18 @@
                         </a:lnSpc>
                       </a:pPr>
                       <a:r>
-                        <a:rPr lang="en-US" sz="1400" kern="150">
+                        <a:rPr lang="en-US" sz="1200" kern="150">
                           <a:effectLst/>
+                          <a:latin typeface="Times New Roman" panose="02020603050405020304" pitchFamily="18" charset="0"/>
+                          <a:cs typeface="Times New Roman" panose="02020603050405020304" pitchFamily="18" charset="0"/>
                         </a:rPr>
                         <a:t>-</a:t>
                       </a:r>
-                      <a:endParaRPr lang="ru-RU" sz="1400" kern="150">
+                      <a:endParaRPr lang="ru-RU" sz="1200" kern="150">
                         <a:effectLst/>
                         <a:latin typeface="Times New Roman" panose="02020603050405020304" pitchFamily="18" charset="0"/>
                         <a:ea typeface="+mn-ea"/>
+                        <a:cs typeface="Times New Roman" panose="02020603050405020304" pitchFamily="18" charset="0"/>
                       </a:endParaRPr>
                     </a:p>
                   </a:txBody>
@@ -6426,15 +5671,18 @@
                         </a:lnSpc>
                       </a:pPr>
                       <a:r>
-                        <a:rPr lang="ru-RU" sz="1400" kern="150">
+                        <a:rPr lang="ru-RU" sz="1200" kern="150">
                           <a:effectLst/>
+                          <a:latin typeface="Times New Roman" panose="02020603050405020304" pitchFamily="18" charset="0"/>
+                          <a:cs typeface="Times New Roman" panose="02020603050405020304" pitchFamily="18" charset="0"/>
                         </a:rPr>
                         <a:t>+</a:t>
                       </a:r>
-                      <a:endParaRPr lang="ru-RU" sz="1400" kern="150">
+                      <a:endParaRPr lang="ru-RU" sz="1200" kern="150">
                         <a:effectLst/>
                         <a:latin typeface="Times New Roman" panose="02020603050405020304" pitchFamily="18" charset="0"/>
                         <a:ea typeface="+mn-ea"/>
+                        <a:cs typeface="Times New Roman" panose="02020603050405020304" pitchFamily="18" charset="0"/>
                       </a:endParaRPr>
                     </a:p>
                   </a:txBody>
@@ -6458,15 +5706,18 @@
                         </a:lnSpc>
                       </a:pPr>
                       <a:r>
-                        <a:rPr lang="ru-RU" sz="1400" b="1" kern="150" dirty="0">
+                        <a:rPr lang="ru-RU" sz="1200" b="1" kern="150" dirty="0">
                           <a:effectLst/>
+                          <a:latin typeface="Times New Roman" panose="02020603050405020304" pitchFamily="18" charset="0"/>
+                          <a:cs typeface="Times New Roman" panose="02020603050405020304" pitchFamily="18" charset="0"/>
                         </a:rPr>
                         <a:t>Веб-интерфейс</a:t>
                       </a:r>
-                      <a:endParaRPr lang="ru-RU" sz="1400" b="1" kern="150" dirty="0">
+                      <a:endParaRPr lang="ru-RU" sz="1200" b="1" kern="150" dirty="0">
                         <a:effectLst/>
                         <a:latin typeface="Times New Roman" panose="02020603050405020304" pitchFamily="18" charset="0"/>
                         <a:ea typeface="+mn-ea"/>
+                        <a:cs typeface="Times New Roman" panose="02020603050405020304" pitchFamily="18" charset="0"/>
                       </a:endParaRPr>
                     </a:p>
                   </a:txBody>
@@ -6483,15 +5734,18 @@
                         </a:lnSpc>
                       </a:pPr>
                       <a:r>
-                        <a:rPr lang="ru-RU" sz="1400" kern="150">
+                        <a:rPr lang="ru-RU" sz="1200" kern="150">
                           <a:effectLst/>
+                          <a:latin typeface="Times New Roman" panose="02020603050405020304" pitchFamily="18" charset="0"/>
+                          <a:cs typeface="Times New Roman" panose="02020603050405020304" pitchFamily="18" charset="0"/>
                         </a:rPr>
                         <a:t>-</a:t>
                       </a:r>
-                      <a:endParaRPr lang="ru-RU" sz="1400" kern="150">
+                      <a:endParaRPr lang="ru-RU" sz="1200" kern="150">
                         <a:effectLst/>
                         <a:latin typeface="Times New Roman" panose="02020603050405020304" pitchFamily="18" charset="0"/>
                         <a:ea typeface="+mn-ea"/>
+                        <a:cs typeface="Times New Roman" panose="02020603050405020304" pitchFamily="18" charset="0"/>
                       </a:endParaRPr>
                     </a:p>
                   </a:txBody>
@@ -6508,15 +5762,18 @@
                         </a:lnSpc>
                       </a:pPr>
                       <a:r>
-                        <a:rPr lang="ru-RU" sz="1400" kern="150">
+                        <a:rPr lang="ru-RU" sz="1200" kern="150">
                           <a:effectLst/>
+                          <a:latin typeface="Times New Roman" panose="02020603050405020304" pitchFamily="18" charset="0"/>
+                          <a:cs typeface="Times New Roman" panose="02020603050405020304" pitchFamily="18" charset="0"/>
                         </a:rPr>
                         <a:t>+</a:t>
                       </a:r>
-                      <a:endParaRPr lang="ru-RU" sz="1400" kern="150">
+                      <a:endParaRPr lang="ru-RU" sz="1200" kern="150">
                         <a:effectLst/>
                         <a:latin typeface="Times New Roman" panose="02020603050405020304" pitchFamily="18" charset="0"/>
                         <a:ea typeface="+mn-ea"/>
+                        <a:cs typeface="Times New Roman" panose="02020603050405020304" pitchFamily="18" charset="0"/>
                       </a:endParaRPr>
                     </a:p>
                   </a:txBody>
@@ -6533,15 +5790,18 @@
                         </a:lnSpc>
                       </a:pPr>
                       <a:r>
-                        <a:rPr lang="en-US" sz="1400" kern="150">
+                        <a:rPr lang="en-US" sz="1200" kern="150">
                           <a:effectLst/>
+                          <a:latin typeface="Times New Roman" panose="02020603050405020304" pitchFamily="18" charset="0"/>
+                          <a:cs typeface="Times New Roman" panose="02020603050405020304" pitchFamily="18" charset="0"/>
                         </a:rPr>
                         <a:t>+</a:t>
                       </a:r>
-                      <a:endParaRPr lang="ru-RU" sz="1400" kern="150">
+                      <a:endParaRPr lang="ru-RU" sz="1200" kern="150">
                         <a:effectLst/>
                         <a:latin typeface="Times New Roman" panose="02020603050405020304" pitchFamily="18" charset="0"/>
                         <a:ea typeface="+mn-ea"/>
+                        <a:cs typeface="Times New Roman" panose="02020603050405020304" pitchFamily="18" charset="0"/>
                       </a:endParaRPr>
                     </a:p>
                   </a:txBody>
@@ -6558,15 +5818,18 @@
                         </a:lnSpc>
                       </a:pPr>
                       <a:r>
-                        <a:rPr lang="ru-RU" sz="1400" kern="150">
+                        <a:rPr lang="ru-RU" sz="1200" kern="150">
                           <a:effectLst/>
+                          <a:latin typeface="Times New Roman" panose="02020603050405020304" pitchFamily="18" charset="0"/>
+                          <a:cs typeface="Times New Roman" panose="02020603050405020304" pitchFamily="18" charset="0"/>
                         </a:rPr>
                         <a:t>+</a:t>
                       </a:r>
-                      <a:endParaRPr lang="ru-RU" sz="1400" kern="150">
+                      <a:endParaRPr lang="ru-RU" sz="1200" kern="150">
                         <a:effectLst/>
                         <a:latin typeface="Times New Roman" panose="02020603050405020304" pitchFamily="18" charset="0"/>
                         <a:ea typeface="+mn-ea"/>
+                        <a:cs typeface="Times New Roman" panose="02020603050405020304" pitchFamily="18" charset="0"/>
                       </a:endParaRPr>
                     </a:p>
                   </a:txBody>
@@ -6590,15 +5853,18 @@
                         </a:lnSpc>
                       </a:pPr>
                       <a:r>
-                        <a:rPr lang="ru-RU" sz="1400" b="1" kern="150" dirty="0">
+                        <a:rPr lang="ru-RU" sz="1200" b="1" kern="150" dirty="0">
                           <a:effectLst/>
+                          <a:latin typeface="Times New Roman" panose="02020603050405020304" pitchFamily="18" charset="0"/>
+                          <a:cs typeface="Times New Roman" panose="02020603050405020304" pitchFamily="18" charset="0"/>
                         </a:rPr>
                         <a:t>Настольное приложение</a:t>
                       </a:r>
-                      <a:endParaRPr lang="ru-RU" sz="1400" b="1" kern="150" dirty="0">
+                      <a:endParaRPr lang="ru-RU" sz="1200" b="1" kern="150" dirty="0">
                         <a:effectLst/>
                         <a:latin typeface="Times New Roman" panose="02020603050405020304" pitchFamily="18" charset="0"/>
                         <a:ea typeface="+mn-ea"/>
+                        <a:cs typeface="Times New Roman" panose="02020603050405020304" pitchFamily="18" charset="0"/>
                       </a:endParaRPr>
                     </a:p>
                   </a:txBody>
@@ -6615,15 +5881,18 @@
                         </a:lnSpc>
                       </a:pPr>
                       <a:r>
-                        <a:rPr lang="ru-RU" sz="1400" kern="150" dirty="0">
+                        <a:rPr lang="ru-RU" sz="1200" kern="150" dirty="0">
                           <a:effectLst/>
+                          <a:latin typeface="Times New Roman" panose="02020603050405020304" pitchFamily="18" charset="0"/>
+                          <a:cs typeface="Times New Roman" panose="02020603050405020304" pitchFamily="18" charset="0"/>
                         </a:rPr>
                         <a:t>+</a:t>
                       </a:r>
-                      <a:endParaRPr lang="ru-RU" sz="1400" kern="150" dirty="0">
+                      <a:endParaRPr lang="ru-RU" sz="1200" kern="150" dirty="0">
                         <a:effectLst/>
                         <a:latin typeface="Times New Roman" panose="02020603050405020304" pitchFamily="18" charset="0"/>
                         <a:ea typeface="+mn-ea"/>
+                        <a:cs typeface="Times New Roman" panose="02020603050405020304" pitchFamily="18" charset="0"/>
                       </a:endParaRPr>
                     </a:p>
                   </a:txBody>
@@ -6640,15 +5909,18 @@
                         </a:lnSpc>
                       </a:pPr>
                       <a:r>
-                        <a:rPr lang="ru-RU" sz="1400" kern="150">
+                        <a:rPr lang="ru-RU" sz="1200" kern="150">
                           <a:effectLst/>
+                          <a:latin typeface="Times New Roman" panose="02020603050405020304" pitchFamily="18" charset="0"/>
+                          <a:cs typeface="Times New Roman" panose="02020603050405020304" pitchFamily="18" charset="0"/>
                         </a:rPr>
                         <a:t>-</a:t>
                       </a:r>
-                      <a:endParaRPr lang="ru-RU" sz="1400" kern="150">
+                      <a:endParaRPr lang="ru-RU" sz="1200" kern="150">
                         <a:effectLst/>
                         <a:latin typeface="Times New Roman" panose="02020603050405020304" pitchFamily="18" charset="0"/>
                         <a:ea typeface="+mn-ea"/>
+                        <a:cs typeface="Times New Roman" panose="02020603050405020304" pitchFamily="18" charset="0"/>
                       </a:endParaRPr>
                     </a:p>
                   </a:txBody>
@@ -6665,15 +5937,18 @@
                         </a:lnSpc>
                       </a:pPr>
                       <a:r>
-                        <a:rPr lang="en-US" sz="1400" kern="150">
+                        <a:rPr lang="en-US" sz="1200" kern="150">
                           <a:effectLst/>
+                          <a:latin typeface="Times New Roman" panose="02020603050405020304" pitchFamily="18" charset="0"/>
+                          <a:cs typeface="Times New Roman" panose="02020603050405020304" pitchFamily="18" charset="0"/>
                         </a:rPr>
                         <a:t>+</a:t>
                       </a:r>
-                      <a:endParaRPr lang="ru-RU" sz="1400" kern="150">
+                      <a:endParaRPr lang="ru-RU" sz="1200" kern="150">
                         <a:effectLst/>
                         <a:latin typeface="Times New Roman" panose="02020603050405020304" pitchFamily="18" charset="0"/>
                         <a:ea typeface="+mn-ea"/>
+                        <a:cs typeface="Times New Roman" panose="02020603050405020304" pitchFamily="18" charset="0"/>
                       </a:endParaRPr>
                     </a:p>
                   </a:txBody>
@@ -6690,15 +5965,18 @@
                         </a:lnSpc>
                       </a:pPr>
                       <a:r>
-                        <a:rPr lang="ru-RU" sz="1400" kern="150" dirty="0">
+                        <a:rPr lang="ru-RU" sz="1200" kern="150" dirty="0">
                           <a:effectLst/>
+                          <a:latin typeface="Times New Roman" panose="02020603050405020304" pitchFamily="18" charset="0"/>
+                          <a:cs typeface="Times New Roman" panose="02020603050405020304" pitchFamily="18" charset="0"/>
                         </a:rPr>
                         <a:t>+</a:t>
                       </a:r>
-                      <a:endParaRPr lang="ru-RU" sz="1400" kern="150" dirty="0">
+                      <a:endParaRPr lang="ru-RU" sz="1200" kern="150" dirty="0">
                         <a:effectLst/>
                         <a:latin typeface="Times New Roman" panose="02020603050405020304" pitchFamily="18" charset="0"/>
                         <a:ea typeface="+mn-ea"/>
+                        <a:cs typeface="Times New Roman" panose="02020603050405020304" pitchFamily="18" charset="0"/>
                       </a:endParaRPr>
                     </a:p>
                   </a:txBody>
@@ -6722,15 +6000,18 @@
                         </a:lnSpc>
                       </a:pPr>
                       <a:r>
-                        <a:rPr lang="ru-RU" sz="1400" b="1" kern="150" dirty="0">
+                        <a:rPr lang="ru-RU" sz="1200" b="1" kern="150" dirty="0">
                           <a:effectLst/>
+                          <a:latin typeface="Times New Roman" panose="02020603050405020304" pitchFamily="18" charset="0"/>
+                          <a:cs typeface="Times New Roman" panose="02020603050405020304" pitchFamily="18" charset="0"/>
                         </a:rPr>
                         <a:t>Трекинг проведенного времени</a:t>
                       </a:r>
-                      <a:endParaRPr lang="ru-RU" sz="1400" b="1" kern="150" dirty="0">
+                      <a:endParaRPr lang="ru-RU" sz="1200" b="1" kern="150" dirty="0">
                         <a:effectLst/>
                         <a:latin typeface="Times New Roman" panose="02020603050405020304" pitchFamily="18" charset="0"/>
                         <a:ea typeface="+mn-ea"/>
+                        <a:cs typeface="Times New Roman" panose="02020603050405020304" pitchFamily="18" charset="0"/>
                       </a:endParaRPr>
                     </a:p>
                   </a:txBody>
@@ -6747,15 +6028,18 @@
                         </a:lnSpc>
                       </a:pPr>
                       <a:r>
-                        <a:rPr lang="ru-RU" sz="1400" kern="150" dirty="0">
+                        <a:rPr lang="ru-RU" sz="1200" kern="150" dirty="0">
                           <a:effectLst/>
+                          <a:latin typeface="Times New Roman" panose="02020603050405020304" pitchFamily="18" charset="0"/>
+                          <a:cs typeface="Times New Roman" panose="02020603050405020304" pitchFamily="18" charset="0"/>
                         </a:rPr>
                         <a:t>-</a:t>
                       </a:r>
-                      <a:endParaRPr lang="ru-RU" sz="1400" kern="150" dirty="0">
+                      <a:endParaRPr lang="ru-RU" sz="1200" kern="150" dirty="0">
                         <a:effectLst/>
                         <a:latin typeface="Times New Roman" panose="02020603050405020304" pitchFamily="18" charset="0"/>
                         <a:ea typeface="+mn-ea"/>
+                        <a:cs typeface="Times New Roman" panose="02020603050405020304" pitchFamily="18" charset="0"/>
                       </a:endParaRPr>
                     </a:p>
                   </a:txBody>
@@ -6772,15 +6056,18 @@
                         </a:lnSpc>
                       </a:pPr>
                       <a:r>
-                        <a:rPr lang="ru-RU" sz="1400" kern="150" dirty="0">
+                        <a:rPr lang="ru-RU" sz="1200" kern="150" dirty="0">
                           <a:effectLst/>
+                          <a:latin typeface="Times New Roman" panose="02020603050405020304" pitchFamily="18" charset="0"/>
+                          <a:cs typeface="Times New Roman" panose="02020603050405020304" pitchFamily="18" charset="0"/>
                         </a:rPr>
                         <a:t>-</a:t>
                       </a:r>
-                      <a:endParaRPr lang="ru-RU" sz="1400" kern="150" dirty="0">
+                      <a:endParaRPr lang="ru-RU" sz="1200" kern="150" dirty="0">
                         <a:effectLst/>
                         <a:latin typeface="Times New Roman" panose="02020603050405020304" pitchFamily="18" charset="0"/>
                         <a:ea typeface="+mn-ea"/>
+                        <a:cs typeface="Times New Roman" panose="02020603050405020304" pitchFamily="18" charset="0"/>
                       </a:endParaRPr>
                     </a:p>
                   </a:txBody>
@@ -6797,15 +6084,18 @@
                         </a:lnSpc>
                       </a:pPr>
                       <a:r>
-                        <a:rPr lang="en-US" sz="1400" kern="150">
+                        <a:rPr lang="en-US" sz="1200" kern="150">
                           <a:effectLst/>
+                          <a:latin typeface="Times New Roman" panose="02020603050405020304" pitchFamily="18" charset="0"/>
+                          <a:cs typeface="Times New Roman" panose="02020603050405020304" pitchFamily="18" charset="0"/>
                         </a:rPr>
                         <a:t>-</a:t>
                       </a:r>
-                      <a:endParaRPr lang="ru-RU" sz="1400" kern="150">
+                      <a:endParaRPr lang="ru-RU" sz="1200" kern="150">
                         <a:effectLst/>
                         <a:latin typeface="Times New Roman" panose="02020603050405020304" pitchFamily="18" charset="0"/>
                         <a:ea typeface="+mn-ea"/>
+                        <a:cs typeface="Times New Roman" panose="02020603050405020304" pitchFamily="18" charset="0"/>
                       </a:endParaRPr>
                     </a:p>
                   </a:txBody>
@@ -6822,15 +6112,18 @@
                         </a:lnSpc>
                       </a:pPr>
                       <a:r>
-                        <a:rPr lang="ru-RU" sz="1400" kern="150">
+                        <a:rPr lang="ru-RU" sz="1200" kern="150">
                           <a:effectLst/>
+                          <a:latin typeface="Times New Roman" panose="02020603050405020304" pitchFamily="18" charset="0"/>
+                          <a:cs typeface="Times New Roman" panose="02020603050405020304" pitchFamily="18" charset="0"/>
                         </a:rPr>
                         <a:t>+</a:t>
                       </a:r>
-                      <a:endParaRPr lang="ru-RU" sz="1400" kern="150">
+                      <a:endParaRPr lang="ru-RU" sz="1200" kern="150">
                         <a:effectLst/>
                         <a:latin typeface="Times New Roman" panose="02020603050405020304" pitchFamily="18" charset="0"/>
                         <a:ea typeface="+mn-ea"/>
+                        <a:cs typeface="Times New Roman" panose="02020603050405020304" pitchFamily="18" charset="0"/>
                       </a:endParaRPr>
                     </a:p>
                   </a:txBody>
@@ -6854,15 +6147,18 @@
                         </a:lnSpc>
                       </a:pPr>
                       <a:r>
-                        <a:rPr lang="ru-RU" sz="1400" b="1" kern="150" dirty="0">
+                        <a:rPr lang="ru-RU" sz="1200" b="1" kern="150" dirty="0">
                           <a:effectLst/>
+                          <a:latin typeface="Times New Roman" panose="02020603050405020304" pitchFamily="18" charset="0"/>
+                          <a:cs typeface="Times New Roman" panose="02020603050405020304" pitchFamily="18" charset="0"/>
                         </a:rPr>
                         <a:t>Краткий пересказ выделенного текста</a:t>
                       </a:r>
-                      <a:endParaRPr lang="ru-RU" sz="1400" b="1" kern="150" dirty="0">
+                      <a:endParaRPr lang="ru-RU" sz="1200" b="1" kern="150" dirty="0">
                         <a:effectLst/>
                         <a:latin typeface="Times New Roman" panose="02020603050405020304" pitchFamily="18" charset="0"/>
                         <a:ea typeface="+mn-ea"/>
+                        <a:cs typeface="Times New Roman" panose="02020603050405020304" pitchFamily="18" charset="0"/>
                       </a:endParaRPr>
                     </a:p>
                   </a:txBody>
@@ -6879,15 +6175,18 @@
                         </a:lnSpc>
                       </a:pPr>
                       <a:r>
-                        <a:rPr lang="ru-RU" sz="1400" kern="150">
+                        <a:rPr lang="ru-RU" sz="1200" kern="150">
                           <a:effectLst/>
+                          <a:latin typeface="Times New Roman" panose="02020603050405020304" pitchFamily="18" charset="0"/>
+                          <a:cs typeface="Times New Roman" panose="02020603050405020304" pitchFamily="18" charset="0"/>
                         </a:rPr>
                         <a:t>-</a:t>
                       </a:r>
-                      <a:endParaRPr lang="ru-RU" sz="1400" kern="150">
+                      <a:endParaRPr lang="ru-RU" sz="1200" kern="150">
                         <a:effectLst/>
                         <a:latin typeface="Times New Roman" panose="02020603050405020304" pitchFamily="18" charset="0"/>
                         <a:ea typeface="+mn-ea"/>
+                        <a:cs typeface="Times New Roman" panose="02020603050405020304" pitchFamily="18" charset="0"/>
                       </a:endParaRPr>
                     </a:p>
                   </a:txBody>
@@ -6904,15 +6203,18 @@
                         </a:lnSpc>
                       </a:pPr>
                       <a:r>
-                        <a:rPr lang="ru-RU" sz="1400" kern="150" dirty="0">
+                        <a:rPr lang="ru-RU" sz="1200" kern="150" dirty="0">
                           <a:effectLst/>
+                          <a:latin typeface="Times New Roman" panose="02020603050405020304" pitchFamily="18" charset="0"/>
+                          <a:cs typeface="Times New Roman" panose="02020603050405020304" pitchFamily="18" charset="0"/>
                         </a:rPr>
                         <a:t>-</a:t>
                       </a:r>
-                      <a:endParaRPr lang="ru-RU" sz="1400" kern="150" dirty="0">
+                      <a:endParaRPr lang="ru-RU" sz="1200" kern="150" dirty="0">
                         <a:effectLst/>
                         <a:latin typeface="Times New Roman" panose="02020603050405020304" pitchFamily="18" charset="0"/>
                         <a:ea typeface="+mn-ea"/>
+                        <a:cs typeface="Times New Roman" panose="02020603050405020304" pitchFamily="18" charset="0"/>
                       </a:endParaRPr>
                     </a:p>
                   </a:txBody>
@@ -6929,15 +6231,18 @@
                         </a:lnSpc>
                       </a:pPr>
                       <a:r>
-                        <a:rPr lang="ru-RU" sz="1400" kern="150" dirty="0">
+                        <a:rPr lang="ru-RU" sz="1200" kern="150" dirty="0">
                           <a:effectLst/>
+                          <a:latin typeface="Times New Roman" panose="02020603050405020304" pitchFamily="18" charset="0"/>
+                          <a:cs typeface="Times New Roman" panose="02020603050405020304" pitchFamily="18" charset="0"/>
                         </a:rPr>
                         <a:t>-</a:t>
                       </a:r>
-                      <a:endParaRPr lang="ru-RU" sz="1400" kern="150" dirty="0">
+                      <a:endParaRPr lang="ru-RU" sz="1200" kern="150" dirty="0">
                         <a:effectLst/>
                         <a:latin typeface="Times New Roman" panose="02020603050405020304" pitchFamily="18" charset="0"/>
                         <a:ea typeface="+mn-ea"/>
+                        <a:cs typeface="Times New Roman" panose="02020603050405020304" pitchFamily="18" charset="0"/>
                       </a:endParaRPr>
                     </a:p>
                   </a:txBody>
@@ -6954,15 +6259,18 @@
                         </a:lnSpc>
                       </a:pPr>
                       <a:r>
-                        <a:rPr lang="ru-RU" sz="1400" kern="150">
+                        <a:rPr lang="ru-RU" sz="1200" kern="150">
                           <a:effectLst/>
+                          <a:latin typeface="Times New Roman" panose="02020603050405020304" pitchFamily="18" charset="0"/>
+                          <a:cs typeface="Times New Roman" panose="02020603050405020304" pitchFamily="18" charset="0"/>
                         </a:rPr>
                         <a:t>+</a:t>
                       </a:r>
-                      <a:endParaRPr lang="ru-RU" sz="1400" kern="150">
+                      <a:endParaRPr lang="ru-RU" sz="1200" kern="150">
                         <a:effectLst/>
                         <a:latin typeface="Times New Roman" panose="02020603050405020304" pitchFamily="18" charset="0"/>
                         <a:ea typeface="+mn-ea"/>
+                        <a:cs typeface="Times New Roman" panose="02020603050405020304" pitchFamily="18" charset="0"/>
                       </a:endParaRPr>
                     </a:p>
                   </a:txBody>
@@ -6986,15 +6294,18 @@
                         </a:lnSpc>
                       </a:pPr>
                       <a:r>
-                        <a:rPr lang="ru-RU" sz="1400" b="1" kern="150" dirty="0">
+                        <a:rPr lang="ru-RU" sz="1200" b="1" kern="150" dirty="0">
                           <a:effectLst/>
+                          <a:latin typeface="Times New Roman" panose="02020603050405020304" pitchFamily="18" charset="0"/>
+                          <a:cs typeface="Times New Roman" panose="02020603050405020304" pitchFamily="18" charset="0"/>
                         </a:rPr>
                         <a:t>Встроенный словарь</a:t>
                       </a:r>
-                      <a:endParaRPr lang="ru-RU" sz="1400" b="1" kern="150" dirty="0">
+                      <a:endParaRPr lang="ru-RU" sz="1200" b="1" kern="150" dirty="0">
                         <a:effectLst/>
                         <a:latin typeface="Times New Roman" panose="02020603050405020304" pitchFamily="18" charset="0"/>
                         <a:ea typeface="+mn-ea"/>
+                        <a:cs typeface="Times New Roman" panose="02020603050405020304" pitchFamily="18" charset="0"/>
                       </a:endParaRPr>
                     </a:p>
                   </a:txBody>
@@ -7011,15 +6322,18 @@
                         </a:lnSpc>
                       </a:pPr>
                       <a:r>
-                        <a:rPr lang="ru-RU" sz="1400" kern="150">
+                        <a:rPr lang="ru-RU" sz="1200" kern="150">
                           <a:effectLst/>
+                          <a:latin typeface="Times New Roman" panose="02020603050405020304" pitchFamily="18" charset="0"/>
+                          <a:cs typeface="Times New Roman" panose="02020603050405020304" pitchFamily="18" charset="0"/>
                         </a:rPr>
                         <a:t>+</a:t>
                       </a:r>
-                      <a:endParaRPr lang="ru-RU" sz="1400" kern="150">
+                      <a:endParaRPr lang="ru-RU" sz="1200" kern="150">
                         <a:effectLst/>
                         <a:latin typeface="Times New Roman" panose="02020603050405020304" pitchFamily="18" charset="0"/>
                         <a:ea typeface="+mn-ea"/>
+                        <a:cs typeface="Times New Roman" panose="02020603050405020304" pitchFamily="18" charset="0"/>
                       </a:endParaRPr>
                     </a:p>
                   </a:txBody>
@@ -7036,15 +6350,18 @@
                         </a:lnSpc>
                       </a:pPr>
                       <a:r>
-                        <a:rPr lang="ru-RU" sz="1400" kern="150">
+                        <a:rPr lang="ru-RU" sz="1200" kern="150">
                           <a:effectLst/>
+                          <a:latin typeface="Times New Roman" panose="02020603050405020304" pitchFamily="18" charset="0"/>
+                          <a:cs typeface="Times New Roman" panose="02020603050405020304" pitchFamily="18" charset="0"/>
                         </a:rPr>
                         <a:t>-</a:t>
                       </a:r>
-                      <a:endParaRPr lang="ru-RU" sz="1400" kern="150">
+                      <a:endParaRPr lang="ru-RU" sz="1200" kern="150">
                         <a:effectLst/>
                         <a:latin typeface="Times New Roman" panose="02020603050405020304" pitchFamily="18" charset="0"/>
                         <a:ea typeface="+mn-ea"/>
+                        <a:cs typeface="Times New Roman" panose="02020603050405020304" pitchFamily="18" charset="0"/>
                       </a:endParaRPr>
                     </a:p>
                   </a:txBody>
@@ -7061,15 +6378,18 @@
                         </a:lnSpc>
                       </a:pPr>
                       <a:r>
-                        <a:rPr lang="ru-RU" sz="1400" kern="150" dirty="0">
+                        <a:rPr lang="ru-RU" sz="1200" kern="150" dirty="0">
                           <a:effectLst/>
+                          <a:latin typeface="Times New Roman" panose="02020603050405020304" pitchFamily="18" charset="0"/>
+                          <a:cs typeface="Times New Roman" panose="02020603050405020304" pitchFamily="18" charset="0"/>
                         </a:rPr>
                         <a:t>-</a:t>
                       </a:r>
-                      <a:endParaRPr lang="ru-RU" sz="1400" kern="150" dirty="0">
+                      <a:endParaRPr lang="ru-RU" sz="1200" kern="150" dirty="0">
                         <a:effectLst/>
                         <a:latin typeface="Times New Roman" panose="02020603050405020304" pitchFamily="18" charset="0"/>
                         <a:ea typeface="+mn-ea"/>
+                        <a:cs typeface="Times New Roman" panose="02020603050405020304" pitchFamily="18" charset="0"/>
                       </a:endParaRPr>
                     </a:p>
                   </a:txBody>
@@ -7086,15 +6406,18 @@
                         </a:lnSpc>
                       </a:pPr>
                       <a:r>
-                        <a:rPr lang="ru-RU" sz="1400" kern="150" dirty="0">
+                        <a:rPr lang="ru-RU" sz="1200" kern="150" dirty="0">
                           <a:effectLst/>
+                          <a:latin typeface="Times New Roman" panose="02020603050405020304" pitchFamily="18" charset="0"/>
+                          <a:cs typeface="Times New Roman" panose="02020603050405020304" pitchFamily="18" charset="0"/>
                         </a:rPr>
                         <a:t>+</a:t>
                       </a:r>
-                      <a:endParaRPr lang="ru-RU" sz="1400" kern="150" dirty="0">
+                      <a:endParaRPr lang="ru-RU" sz="1200" kern="150" dirty="0">
                         <a:effectLst/>
                         <a:latin typeface="Times New Roman" panose="02020603050405020304" pitchFamily="18" charset="0"/>
                         <a:ea typeface="+mn-ea"/>
+                        <a:cs typeface="Times New Roman" panose="02020603050405020304" pitchFamily="18" charset="0"/>
                       </a:endParaRPr>
                     </a:p>
                   </a:txBody>
@@ -7118,15 +6441,18 @@
                         </a:lnSpc>
                       </a:pPr>
                       <a:r>
-                        <a:rPr lang="ru-RU" sz="1400" b="1" kern="150" dirty="0">
+                        <a:rPr lang="ru-RU" sz="1200" b="1" kern="150" dirty="0">
                           <a:effectLst/>
+                          <a:latin typeface="Times New Roman" panose="02020603050405020304" pitchFamily="18" charset="0"/>
+                          <a:cs typeface="Times New Roman" panose="02020603050405020304" pitchFamily="18" charset="0"/>
                         </a:rPr>
                         <a:t>Лицензия исходного кода программы</a:t>
                       </a:r>
-                      <a:endParaRPr lang="ru-RU" sz="1400" b="1" kern="150" dirty="0">
+                      <a:endParaRPr lang="ru-RU" sz="1200" b="1" kern="150" dirty="0">
                         <a:effectLst/>
                         <a:latin typeface="Times New Roman" panose="02020603050405020304" pitchFamily="18" charset="0"/>
                         <a:ea typeface="+mn-ea"/>
+                        <a:cs typeface="Times New Roman" panose="02020603050405020304" pitchFamily="18" charset="0"/>
                       </a:endParaRPr>
                     </a:p>
                   </a:txBody>
@@ -7143,15 +6469,18 @@
                         </a:lnSpc>
                       </a:pPr>
                       <a:r>
-                        <a:rPr lang="en-US" sz="1400" kern="150">
+                        <a:rPr lang="en-US" sz="1200" kern="150" dirty="0">
                           <a:effectLst/>
+                          <a:latin typeface="Times New Roman" panose="02020603050405020304" pitchFamily="18" charset="0"/>
+                          <a:cs typeface="Times New Roman" panose="02020603050405020304" pitchFamily="18" charset="0"/>
                         </a:rPr>
                         <a:t>GPL 3.0</a:t>
                       </a:r>
-                      <a:endParaRPr lang="ru-RU" sz="1400" kern="150">
+                      <a:endParaRPr lang="ru-RU" sz="1200" kern="150" dirty="0">
                         <a:effectLst/>
                         <a:latin typeface="Times New Roman" panose="02020603050405020304" pitchFamily="18" charset="0"/>
                         <a:ea typeface="+mn-ea"/>
+                        <a:cs typeface="Times New Roman" panose="02020603050405020304" pitchFamily="18" charset="0"/>
                       </a:endParaRPr>
                     </a:p>
                   </a:txBody>
@@ -7168,15 +6497,18 @@
                         </a:lnSpc>
                       </a:pPr>
                       <a:r>
-                        <a:rPr lang="en-US" sz="1400" kern="150">
+                        <a:rPr lang="en-US" sz="1200" kern="150">
                           <a:effectLst/>
+                          <a:latin typeface="Times New Roman" panose="02020603050405020304" pitchFamily="18" charset="0"/>
+                          <a:cs typeface="Times New Roman" panose="02020603050405020304" pitchFamily="18" charset="0"/>
                         </a:rPr>
                         <a:t>GPL 3.0</a:t>
                       </a:r>
-                      <a:endParaRPr lang="ru-RU" sz="1400" kern="150">
+                      <a:endParaRPr lang="ru-RU" sz="1200" kern="150">
                         <a:effectLst/>
                         <a:latin typeface="Times New Roman" panose="02020603050405020304" pitchFamily="18" charset="0"/>
                         <a:ea typeface="+mn-ea"/>
+                        <a:cs typeface="Times New Roman" panose="02020603050405020304" pitchFamily="18" charset="0"/>
                       </a:endParaRPr>
                     </a:p>
                   </a:txBody>
@@ -7193,15 +6525,18 @@
                         </a:lnSpc>
                       </a:pPr>
                       <a:r>
-                        <a:rPr lang="en-US" sz="1400" kern="150">
+                        <a:rPr lang="en-US" sz="1200" kern="150" dirty="0">
                           <a:effectLst/>
+                          <a:latin typeface="Times New Roman" panose="02020603050405020304" pitchFamily="18" charset="0"/>
+                          <a:cs typeface="Times New Roman" panose="02020603050405020304" pitchFamily="18" charset="0"/>
                         </a:rPr>
                         <a:t>AGPL 3.0</a:t>
                       </a:r>
-                      <a:endParaRPr lang="ru-RU" sz="1400" kern="150">
+                      <a:endParaRPr lang="ru-RU" sz="1200" kern="150" dirty="0">
                         <a:effectLst/>
                         <a:latin typeface="Times New Roman" panose="02020603050405020304" pitchFamily="18" charset="0"/>
                         <a:ea typeface="+mn-ea"/>
+                        <a:cs typeface="Times New Roman" panose="02020603050405020304" pitchFamily="18" charset="0"/>
                       </a:endParaRPr>
                     </a:p>
                   </a:txBody>
@@ -7218,15 +6553,18 @@
                         </a:lnSpc>
                       </a:pPr>
                       <a:r>
-                        <a:rPr lang="en-US" sz="1400" kern="150" dirty="0">
+                        <a:rPr lang="en-US" sz="1200" kern="150" dirty="0">
                           <a:effectLst/>
+                          <a:latin typeface="Times New Roman" panose="02020603050405020304" pitchFamily="18" charset="0"/>
+                          <a:cs typeface="Times New Roman" panose="02020603050405020304" pitchFamily="18" charset="0"/>
                         </a:rPr>
                         <a:t>MIT</a:t>
                       </a:r>
-                      <a:endParaRPr lang="ru-RU" sz="1400" kern="150" dirty="0">
+                      <a:endParaRPr lang="ru-RU" sz="1200" kern="150" dirty="0">
                         <a:effectLst/>
                         <a:latin typeface="Times New Roman" panose="02020603050405020304" pitchFamily="18" charset="0"/>
                         <a:ea typeface="+mn-ea"/>
+                        <a:cs typeface="Times New Roman" panose="02020603050405020304" pitchFamily="18" charset="0"/>
                       </a:endParaRPr>
                     </a:p>
                   </a:txBody>
@@ -7290,7 +6628,7 @@
         </p:nvSpPr>
         <p:spPr>
           <a:xfrm>
-            <a:off x="294894" y="1136469"/>
+            <a:off x="360000" y="1170000"/>
             <a:ext cx="7269480" cy="994172"/>
           </a:xfrm>
         </p:spPr>
@@ -7299,8 +6637,16 @@
           <a:lstStyle/>
           <a:p>
             <a:r>
+              <a:rPr lang="ru-RU" sz="2800" b="1" u="sng" dirty="0"/>
+              <a:t>Выбранные</a:t>
+            </a:r>
+            <a:r>
               <a:rPr lang="ru-RU" b="1" u="sng" dirty="0"/>
-              <a:t>Выбранные технологии</a:t>
+              <a:t> </a:t>
+            </a:r>
+            <a:r>
+              <a:rPr lang="ru-RU" sz="2800" b="1" u="sng" dirty="0"/>
+              <a:t>технологии</a:t>
             </a:r>
           </a:p>
         </p:txBody>
@@ -7323,7 +6669,7 @@
         </p:nvSpPr>
         <p:spPr>
           <a:xfrm>
-            <a:off x="373271" y="2248444"/>
+            <a:off x="360000" y="2287632"/>
             <a:ext cx="6446520" cy="3263503"/>
           </a:xfrm>
         </p:spPr>
@@ -7374,12 +6720,16 @@
               <a:t> (клиентская часть)</a:t>
             </a:r>
             <a:r>
-              <a:rPr lang="en-US" sz="1800" dirty="0">
+              <a:rPr lang="en-US" dirty="0">
                 <a:latin typeface="Times New Roman" panose="02020603050405020304" pitchFamily="18" charset="0"/>
                 <a:cs typeface="Times New Roman" panose="02020603050405020304" pitchFamily="18" charset="0"/>
               </a:rPr>
-              <a:t>;</a:t>
-            </a:r>
+              <a:t>.</a:t>
+            </a:r>
+            <a:endParaRPr lang="en-US" sz="1800" dirty="0">
+              <a:latin typeface="Times New Roman" panose="02020603050405020304" pitchFamily="18" charset="0"/>
+              <a:cs typeface="Times New Roman" panose="02020603050405020304" pitchFamily="18" charset="0"/>
+            </a:endParaRPr>
           </a:p>
           <a:p>
             <a:pPr>
@@ -7427,7 +6777,7 @@
                 <a:latin typeface="Times New Roman" panose="02020603050405020304" pitchFamily="18" charset="0"/>
                 <a:cs typeface="Times New Roman" panose="02020603050405020304" pitchFamily="18" charset="0"/>
               </a:rPr>
-              <a:t>;</a:t>
+              <a:t>.</a:t>
             </a:r>
             <a:endParaRPr lang="ru-RU" sz="1800" dirty="0">
               <a:latin typeface="Times New Roman" panose="02020603050405020304" pitchFamily="18" charset="0"/>
@@ -7523,17 +6873,19 @@
         </p:nvSpPr>
         <p:spPr>
           <a:xfrm>
-            <a:off x="300446" y="1151164"/>
+            <a:off x="360000" y="1170000"/>
             <a:ext cx="7269480" cy="994172"/>
           </a:xfrm>
         </p:spPr>
         <p:txBody>
-          <a:bodyPr/>
+          <a:bodyPr>
+            <a:normAutofit/>
+          </a:bodyPr>
           <a:lstStyle/>
           <a:p>
             <a:r>
-              <a:rPr lang="ru-RU" b="1" u="sng" dirty="0"/>
-              <a:t>Страницы</a:t>
+              <a:rPr lang="ru-RU" sz="2800" b="1" u="sng" dirty="0"/>
+              <a:t>Основные разделы</a:t>
             </a:r>
           </a:p>
         </p:txBody>
@@ -7556,13 +6908,13 @@
         </p:nvSpPr>
         <p:spPr>
           <a:xfrm>
-            <a:off x="300446" y="2231368"/>
-            <a:ext cx="4743450" cy="3263504"/>
+            <a:off x="359999" y="2424496"/>
+            <a:ext cx="7269479" cy="3263504"/>
           </a:xfrm>
         </p:spPr>
         <p:txBody>
           <a:bodyPr>
-            <a:normAutofit fontScale="92500" lnSpcReduction="10000"/>
+            <a:normAutofit/>
           </a:bodyPr>
           <a:lstStyle/>
           <a:p>
@@ -7577,7 +6929,35 @@
                 <a:latin typeface="Times New Roman" panose="02020603050405020304" pitchFamily="18" charset="0"/>
                 <a:cs typeface="Times New Roman" panose="02020603050405020304" pitchFamily="18" charset="0"/>
               </a:rPr>
-              <a:t>Состоит из пяти основных страниц</a:t>
+              <a:t>Состоит </a:t>
+            </a:r>
+            <a:r>
+              <a:rPr lang="ru-RU" sz="1800">
+                <a:latin typeface="Times New Roman" panose="02020603050405020304" pitchFamily="18" charset="0"/>
+                <a:cs typeface="Times New Roman" panose="02020603050405020304" pitchFamily="18" charset="0"/>
+              </a:rPr>
+              <a:t>из ч</a:t>
+            </a:r>
+            <a:r>
+              <a:rPr lang="ru-RU">
+                <a:latin typeface="Times New Roman" panose="02020603050405020304" pitchFamily="18" charset="0"/>
+                <a:cs typeface="Times New Roman" panose="02020603050405020304" pitchFamily="18" charset="0"/>
+              </a:rPr>
+              <a:t>етырёх</a:t>
+            </a:r>
+            <a:r>
+              <a:rPr lang="ru-RU" sz="1800">
+                <a:latin typeface="Times New Roman" panose="02020603050405020304" pitchFamily="18" charset="0"/>
+                <a:cs typeface="Times New Roman" panose="02020603050405020304" pitchFamily="18" charset="0"/>
+              </a:rPr>
+              <a:t> </a:t>
+            </a:r>
+            <a:r>
+              <a:rPr lang="ru-RU" sz="1800" dirty="0">
+                <a:latin typeface="Times New Roman" panose="02020603050405020304" pitchFamily="18" charset="0"/>
+                <a:cs typeface="Times New Roman" panose="02020603050405020304" pitchFamily="18" charset="0"/>
+              </a:rPr>
+              <a:t>основных разделов</a:t>
             </a:r>
             <a:r>
               <a:rPr lang="en-US" sz="1800" dirty="0">
@@ -7585,20 +6965,6 @@
                 <a:cs typeface="Times New Roman" panose="02020603050405020304" pitchFamily="18" charset="0"/>
               </a:rPr>
               <a:t>:</a:t>
-            </a:r>
-          </a:p>
-          <a:p>
-            <a:pPr>
-              <a:lnSpc>
-                <a:spcPct val="150000"/>
-              </a:lnSpc>
-            </a:pPr>
-            <a:r>
-              <a:rPr lang="ru-RU" sz="1800" dirty="0">
-                <a:latin typeface="Times New Roman" panose="02020603050405020304" pitchFamily="18" charset="0"/>
-                <a:cs typeface="Times New Roman" panose="02020603050405020304" pitchFamily="18" charset="0"/>
-              </a:rPr>
-              <a:t>Страница входа в систему.</a:t>
             </a:r>
           </a:p>
           <a:p>
@@ -7694,218 +7060,6 @@
           <p:cNvPr id="2" name="Заголовок 1">
             <a:extLst>
               <a:ext uri="{FF2B5EF4-FFF2-40B4-BE49-F238E27FC236}">
-                <a16:creationId xmlns:a16="http://schemas.microsoft.com/office/drawing/2014/main" id="{ABABFA6C-955D-5F9A-A7F9-2A61ED800F94}"/>
-              </a:ext>
-            </a:extLst>
-          </p:cNvPr>
-          <p:cNvSpPr>
-            <a:spLocks noGrp="1"/>
-          </p:cNvSpPr>
-          <p:nvPr>
-            <p:ph type="title"/>
-          </p:nvPr>
-        </p:nvSpPr>
-        <p:spPr>
-          <a:xfrm>
-            <a:off x="358575" y="1156063"/>
-            <a:ext cx="7269480" cy="994172"/>
-          </a:xfrm>
-        </p:spPr>
-        <p:txBody>
-          <a:bodyPr/>
-          <a:lstStyle/>
-          <a:p>
-            <a:r>
-              <a:rPr lang="ru-RU" b="1" u="sng" dirty="0"/>
-              <a:t>Страница входа в систему</a:t>
-            </a:r>
-          </a:p>
-        </p:txBody>
-      </p:sp>
-      <p:pic>
-        <p:nvPicPr>
-          <p:cNvPr id="13" name="Объект 12">
-            <a:extLst>
-              <a:ext uri="{FF2B5EF4-FFF2-40B4-BE49-F238E27FC236}">
-                <a16:creationId xmlns:a16="http://schemas.microsoft.com/office/drawing/2014/main" id="{335C6985-0BCB-4A33-7A4C-4BA138DE5747}"/>
-              </a:ext>
-            </a:extLst>
-          </p:cNvPr>
-          <p:cNvPicPr>
-            <a:picLocks noGrp="1" noChangeAspect="1"/>
-          </p:cNvPicPr>
-          <p:nvPr>
-            <p:ph idx="1"/>
-          </p:nvPr>
-        </p:nvPicPr>
-        <p:blipFill>
-          <a:blip r:embed="rId3">
-            <a:extLst>
-              <a:ext uri="{28A0092B-C50C-407E-A947-70E740481C1C}">
-                <a14:useLocalDpi xmlns:a14="http://schemas.microsoft.com/office/drawing/2010/main" val="0"/>
-              </a:ext>
-            </a:extLst>
-          </a:blip>
-          <a:stretch>
-            <a:fillRect/>
-          </a:stretch>
-        </p:blipFill>
-        <p:spPr>
-          <a:xfrm>
-            <a:off x="770293" y="2507565"/>
-            <a:ext cx="6446044" cy="3094693"/>
-          </a:xfrm>
-          <a:effectLst>
-            <a:outerShdw blurRad="50800" dist="38100" dir="2700000" algn="tl" rotWithShape="0">
-              <a:prstClr val="black">
-                <a:alpha val="40000"/>
-              </a:prstClr>
-            </a:outerShdw>
-          </a:effectLst>
-        </p:spPr>
-      </p:pic>
-    </p:spTree>
-    <p:extLst>
-      <p:ext uri="{BB962C8B-B14F-4D97-AF65-F5344CB8AC3E}">
-        <p14:creationId xmlns:p14="http://schemas.microsoft.com/office/powerpoint/2010/main" val="1470875669"/>
-      </p:ext>
-    </p:extLst>
-  </p:cSld>
-  <p:clrMapOvr>
-    <a:masterClrMapping/>
-  </p:clrMapOvr>
-</p:sld>
-</file>
-
-<file path=ppt/slides/slide8.xml><?xml version="1.0" encoding="utf-8"?>
-<p:sld xmlns:a="http://schemas.openxmlformats.org/drawingml/2006/main" xmlns:r="http://schemas.openxmlformats.org/officeDocument/2006/relationships" xmlns:p="http://schemas.openxmlformats.org/presentationml/2006/main">
-  <p:cSld>
-    <p:spTree>
-      <p:nvGrpSpPr>
-        <p:cNvPr id="1" name=""/>
-        <p:cNvGrpSpPr/>
-        <p:nvPr/>
-      </p:nvGrpSpPr>
-      <p:grpSpPr>
-        <a:xfrm>
-          <a:off x="0" y="0"/>
-          <a:ext cx="0" cy="0"/>
-          <a:chOff x="0" y="0"/>
-          <a:chExt cx="0" cy="0"/>
-        </a:xfrm>
-      </p:grpSpPr>
-      <p:sp>
-        <p:nvSpPr>
-          <p:cNvPr id="2" name="Заголовок 1">
-            <a:extLst>
-              <a:ext uri="{FF2B5EF4-FFF2-40B4-BE49-F238E27FC236}">
-                <a16:creationId xmlns:a16="http://schemas.microsoft.com/office/drawing/2014/main" id="{ABABFA6C-955D-5F9A-A7F9-2A61ED800F94}"/>
-              </a:ext>
-            </a:extLst>
-          </p:cNvPr>
-          <p:cNvSpPr>
-            <a:spLocks noGrp="1"/>
-          </p:cNvSpPr>
-          <p:nvPr>
-            <p:ph type="title"/>
-          </p:nvPr>
-        </p:nvSpPr>
-        <p:spPr>
-          <a:xfrm>
-            <a:off x="417359" y="1239338"/>
-            <a:ext cx="7269480" cy="994172"/>
-          </a:xfrm>
-        </p:spPr>
-        <p:txBody>
-          <a:bodyPr>
-            <a:normAutofit fontScale="90000"/>
-          </a:bodyPr>
-          <a:lstStyle/>
-          <a:p>
-            <a:r>
-              <a:rPr lang="ru-RU" b="1" u="sng" dirty="0"/>
-              <a:t>Страница списка недавно открытых книг</a:t>
-            </a:r>
-          </a:p>
-        </p:txBody>
-      </p:sp>
-      <p:pic>
-        <p:nvPicPr>
-          <p:cNvPr id="7" name="Объект 6">
-            <a:extLst>
-              <a:ext uri="{FF2B5EF4-FFF2-40B4-BE49-F238E27FC236}">
-                <a16:creationId xmlns:a16="http://schemas.microsoft.com/office/drawing/2014/main" id="{2D05F3FB-F0BD-4926-F187-4CF023AE4299}"/>
-              </a:ext>
-            </a:extLst>
-          </p:cNvPr>
-          <p:cNvPicPr>
-            <a:picLocks noGrp="1" noChangeAspect="1"/>
-          </p:cNvPicPr>
-          <p:nvPr>
-            <p:ph idx="1"/>
-          </p:nvPr>
-        </p:nvPicPr>
-        <p:blipFill>
-          <a:blip r:embed="rId3">
-            <a:extLst>
-              <a:ext uri="{28A0092B-C50C-407E-A947-70E740481C1C}">
-                <a14:useLocalDpi xmlns:a14="http://schemas.microsoft.com/office/drawing/2010/main" val="0"/>
-              </a:ext>
-            </a:extLst>
-          </a:blip>
-          <a:stretch>
-            <a:fillRect/>
-          </a:stretch>
-        </p:blipFill>
-        <p:spPr>
-          <a:xfrm>
-            <a:off x="417502" y="2617086"/>
-            <a:ext cx="6446044" cy="2702569"/>
-          </a:xfrm>
-          <a:effectLst>
-            <a:outerShdw blurRad="50800" dist="38100" dir="2700000" algn="tl" rotWithShape="0">
-              <a:prstClr val="black">
-                <a:alpha val="40000"/>
-              </a:prstClr>
-            </a:outerShdw>
-          </a:effectLst>
-        </p:spPr>
-      </p:pic>
-    </p:spTree>
-    <p:extLst>
-      <p:ext uri="{BB962C8B-B14F-4D97-AF65-F5344CB8AC3E}">
-        <p14:creationId xmlns:p14="http://schemas.microsoft.com/office/powerpoint/2010/main" val="143211331"/>
-      </p:ext>
-    </p:extLst>
-  </p:cSld>
-  <p:clrMapOvr>
-    <a:masterClrMapping/>
-  </p:clrMapOvr>
-</p:sld>
-</file>
-
-<file path=ppt/slides/slide9.xml><?xml version="1.0" encoding="utf-8"?>
-<p:sld xmlns:a="http://schemas.openxmlformats.org/drawingml/2006/main" xmlns:r="http://schemas.openxmlformats.org/officeDocument/2006/relationships" xmlns:p="http://schemas.openxmlformats.org/presentationml/2006/main">
-  <p:cSld>
-    <p:spTree>
-      <p:nvGrpSpPr>
-        <p:cNvPr id="1" name=""/>
-        <p:cNvGrpSpPr/>
-        <p:nvPr/>
-      </p:nvGrpSpPr>
-      <p:grpSpPr>
-        <a:xfrm>
-          <a:off x="0" y="0"/>
-          <a:ext cx="0" cy="0"/>
-          <a:chOff x="0" y="0"/>
-          <a:chExt cx="0" cy="0"/>
-        </a:xfrm>
-      </p:grpSpPr>
-      <p:sp>
-        <p:nvSpPr>
-          <p:cNvPr id="2" name="Заголовок 1">
-            <a:extLst>
-              <a:ext uri="{FF2B5EF4-FFF2-40B4-BE49-F238E27FC236}">
                 <a16:creationId xmlns:a16="http://schemas.microsoft.com/office/drawing/2014/main" id="{2E82A089-67C8-6737-768B-5D7EBF7B9E0E}"/>
               </a:ext>
             </a:extLst>
@@ -7919,7 +7073,7 @@
         </p:nvSpPr>
         <p:spPr>
           <a:xfrm>
-            <a:off x="368372" y="1156063"/>
+            <a:off x="360000" y="1170000"/>
             <a:ext cx="7269480" cy="994172"/>
           </a:xfrm>
         </p:spPr>
@@ -7928,10 +7082,17 @@
           <a:lstStyle/>
           <a:p>
             <a:r>
-              <a:rPr lang="ru-RU" b="1" u="sng" dirty="0"/>
+              <a:rPr lang="ru-RU" sz="2800" b="1" u="sng" dirty="0"/>
               <a:t>Страница списка книг</a:t>
             </a:r>
-            <a:endParaRPr lang="ru-RU" dirty="0"/>
+            <a:r>
+              <a:rPr lang="en-US" sz="2800" b="1" u="sng" dirty="0"/>
+              <a:t> </a:t>
+            </a:r>
+            <a:r>
+              <a:rPr lang="ru-RU" sz="2800" b="1" u="sng" dirty="0"/>
+              <a:t>и недавно открытых книг</a:t>
+            </a:r>
           </a:p>
         </p:txBody>
       </p:sp>
@@ -7996,8 +7157,51 @@
         </p:blipFill>
         <p:spPr>
           <a:xfrm>
-            <a:off x="2727368" y="3293101"/>
+            <a:off x="3178036" y="2796713"/>
             <a:ext cx="5049078" cy="2116877"/>
+          </a:xfrm>
+          <a:prstGeom prst="rect">
+            <a:avLst/>
+          </a:prstGeom>
+          <a:effectLst>
+            <a:outerShdw blurRad="50800" dist="38100" dir="2700000" algn="tl" rotWithShape="0">
+              <a:prstClr val="black">
+                <a:alpha val="40000"/>
+              </a:prstClr>
+            </a:outerShdw>
+          </a:effectLst>
+        </p:spPr>
+      </p:pic>
+      <p:pic>
+        <p:nvPicPr>
+          <p:cNvPr id="3" name="Объект 6">
+            <a:extLst>
+              <a:ext uri="{FF2B5EF4-FFF2-40B4-BE49-F238E27FC236}">
+                <a16:creationId xmlns:a16="http://schemas.microsoft.com/office/drawing/2014/main" id="{2D05F3FB-F0BD-4926-F187-4CF023AE4299}"/>
+              </a:ext>
+            </a:extLst>
+          </p:cNvPr>
+          <p:cNvPicPr>
+            <a:picLocks noChangeAspect="1"/>
+          </p:cNvPicPr>
+          <p:nvPr/>
+        </p:nvPicPr>
+        <p:blipFill>
+          <a:blip r:embed="rId4">
+            <a:extLst>
+              <a:ext uri="{28A0092B-C50C-407E-A947-70E740481C1C}">
+                <a14:useLocalDpi xmlns:a14="http://schemas.microsoft.com/office/drawing/2010/main" val="0"/>
+              </a:ext>
+            </a:extLst>
+          </a:blip>
+          <a:stretch>
+            <a:fillRect/>
+          </a:stretch>
+        </p:blipFill>
+        <p:spPr>
+          <a:xfrm>
+            <a:off x="660446" y="4129500"/>
+            <a:ext cx="5276623" cy="2212277"/>
           </a:xfrm>
           <a:prstGeom prst="rect">
             <a:avLst/>
@@ -8015,6 +7219,479 @@
     <p:extLst>
       <p:ext uri="{BB962C8B-B14F-4D97-AF65-F5344CB8AC3E}">
         <p14:creationId xmlns:p14="http://schemas.microsoft.com/office/powerpoint/2010/main" val="364673470"/>
+      </p:ext>
+    </p:extLst>
+  </p:cSld>
+  <p:clrMapOvr>
+    <a:masterClrMapping/>
+  </p:clrMapOvr>
+</p:sld>
+</file>
+
+<file path=ppt/slides/slide8.xml><?xml version="1.0" encoding="utf-8"?>
+<p:sld xmlns:a="http://schemas.openxmlformats.org/drawingml/2006/main" xmlns:r="http://schemas.openxmlformats.org/officeDocument/2006/relationships" xmlns:p="http://schemas.openxmlformats.org/presentationml/2006/main">
+  <p:cSld>
+    <p:spTree>
+      <p:nvGrpSpPr>
+        <p:cNvPr id="1" name=""/>
+        <p:cNvGrpSpPr/>
+        <p:nvPr/>
+      </p:nvGrpSpPr>
+      <p:grpSpPr>
+        <a:xfrm>
+          <a:off x="0" y="0"/>
+          <a:ext cx="0" cy="0"/>
+          <a:chOff x="0" y="0"/>
+          <a:chExt cx="0" cy="0"/>
+        </a:xfrm>
+      </p:grpSpPr>
+      <p:sp>
+        <p:nvSpPr>
+          <p:cNvPr id="2" name="Заголовок 1">
+            <a:extLst>
+              <a:ext uri="{FF2B5EF4-FFF2-40B4-BE49-F238E27FC236}">
+                <a16:creationId xmlns:a16="http://schemas.microsoft.com/office/drawing/2014/main" id="{2E82A089-67C8-6737-768B-5D7EBF7B9E0E}"/>
+              </a:ext>
+            </a:extLst>
+          </p:cNvPr>
+          <p:cNvSpPr>
+            <a:spLocks noGrp="1"/>
+          </p:cNvSpPr>
+          <p:nvPr>
+            <p:ph type="title"/>
+          </p:nvPr>
+        </p:nvSpPr>
+        <p:spPr>
+          <a:xfrm>
+            <a:off x="360000" y="1170000"/>
+            <a:ext cx="7269480" cy="994172"/>
+          </a:xfrm>
+        </p:spPr>
+        <p:txBody>
+          <a:bodyPr>
+            <a:normAutofit/>
+          </a:bodyPr>
+          <a:lstStyle/>
+          <a:p>
+            <a:r>
+              <a:rPr lang="ru-RU" sz="2800" b="1" u="sng" dirty="0"/>
+              <a:t>Страница просмотра документа</a:t>
+            </a:r>
+          </a:p>
+        </p:txBody>
+      </p:sp>
+      <p:pic>
+        <p:nvPicPr>
+          <p:cNvPr id="6" name="Рисунок 5">
+            <a:extLst>
+              <a:ext uri="{FF2B5EF4-FFF2-40B4-BE49-F238E27FC236}">
+                <a16:creationId xmlns:a16="http://schemas.microsoft.com/office/drawing/2014/main" id="{7F332726-7FC6-DA2C-D2E5-16F2521C9E54}"/>
+              </a:ext>
+            </a:extLst>
+          </p:cNvPr>
+          <p:cNvPicPr>
+            <a:picLocks noChangeAspect="1"/>
+          </p:cNvPicPr>
+          <p:nvPr/>
+        </p:nvPicPr>
+        <p:blipFill>
+          <a:blip r:embed="rId3">
+            <a:extLst>
+              <a:ext uri="{28A0092B-C50C-407E-A947-70E740481C1C}">
+                <a14:useLocalDpi xmlns:a14="http://schemas.microsoft.com/office/drawing/2010/main" val="0"/>
+              </a:ext>
+            </a:extLst>
+          </a:blip>
+          <a:stretch>
+            <a:fillRect/>
+          </a:stretch>
+        </p:blipFill>
+        <p:spPr>
+          <a:xfrm>
+            <a:off x="383722" y="2291859"/>
+            <a:ext cx="6065522" cy="2543032"/>
+          </a:xfrm>
+          <a:prstGeom prst="rect">
+            <a:avLst/>
+          </a:prstGeom>
+          <a:effectLst>
+            <a:outerShdw blurRad="50800" dist="38100" dir="2700000" algn="tl" rotWithShape="0">
+              <a:prstClr val="black">
+                <a:alpha val="40000"/>
+              </a:prstClr>
+            </a:outerShdw>
+          </a:effectLst>
+        </p:spPr>
+      </p:pic>
+      <p:pic>
+        <p:nvPicPr>
+          <p:cNvPr id="10" name="Рисунок 9">
+            <a:extLst>
+              <a:ext uri="{FF2B5EF4-FFF2-40B4-BE49-F238E27FC236}">
+                <a16:creationId xmlns:a16="http://schemas.microsoft.com/office/drawing/2014/main" id="{645735AF-25F2-088B-85AE-8DD117302323}"/>
+              </a:ext>
+            </a:extLst>
+          </p:cNvPr>
+          <p:cNvPicPr>
+            <a:picLocks noChangeAspect="1"/>
+          </p:cNvPicPr>
+          <p:nvPr/>
+        </p:nvPicPr>
+        <p:blipFill>
+          <a:blip r:embed="rId4">
+            <a:extLst>
+              <a:ext uri="{28A0092B-C50C-407E-A947-70E740481C1C}">
+                <a14:useLocalDpi xmlns:a14="http://schemas.microsoft.com/office/drawing/2010/main" val="0"/>
+              </a:ext>
+            </a:extLst>
+          </a:blip>
+          <a:stretch>
+            <a:fillRect/>
+          </a:stretch>
+        </p:blipFill>
+        <p:spPr>
+          <a:xfrm>
+            <a:off x="4300404" y="4274773"/>
+            <a:ext cx="3446444" cy="1120237"/>
+          </a:xfrm>
+          <a:prstGeom prst="rect">
+            <a:avLst/>
+          </a:prstGeom>
+          <a:effectLst>
+            <a:outerShdw blurRad="50800" dist="38100" dir="2700000" algn="tl" rotWithShape="0">
+              <a:prstClr val="black">
+                <a:alpha val="40000"/>
+              </a:prstClr>
+            </a:outerShdw>
+          </a:effectLst>
+        </p:spPr>
+      </p:pic>
+    </p:spTree>
+    <p:extLst>
+      <p:ext uri="{BB962C8B-B14F-4D97-AF65-F5344CB8AC3E}">
+        <p14:creationId xmlns:p14="http://schemas.microsoft.com/office/powerpoint/2010/main" val="3951106101"/>
+      </p:ext>
+    </p:extLst>
+  </p:cSld>
+  <p:clrMapOvr>
+    <a:masterClrMapping/>
+  </p:clrMapOvr>
+</p:sld>
+</file>
+
+<file path=ppt/slides/slide9.xml><?xml version="1.0" encoding="utf-8"?>
+<p:sld xmlns:a="http://schemas.openxmlformats.org/drawingml/2006/main" xmlns:r="http://schemas.openxmlformats.org/officeDocument/2006/relationships" xmlns:p="http://schemas.openxmlformats.org/presentationml/2006/main">
+  <p:cSld>
+    <p:spTree>
+      <p:nvGrpSpPr>
+        <p:cNvPr id="1" name=""/>
+        <p:cNvGrpSpPr/>
+        <p:nvPr/>
+      </p:nvGrpSpPr>
+      <p:grpSpPr>
+        <a:xfrm>
+          <a:off x="0" y="0"/>
+          <a:ext cx="0" cy="0"/>
+          <a:chOff x="0" y="0"/>
+          <a:chExt cx="0" cy="0"/>
+        </a:xfrm>
+      </p:grpSpPr>
+      <p:sp>
+        <p:nvSpPr>
+          <p:cNvPr id="6" name="Заголовок 1">
+            <a:extLst>
+              <a:ext uri="{FF2B5EF4-FFF2-40B4-BE49-F238E27FC236}">
+                <a16:creationId xmlns:a16="http://schemas.microsoft.com/office/drawing/2014/main" id="{76277648-A197-6531-0425-FA34692EAC27}"/>
+              </a:ext>
+            </a:extLst>
+          </p:cNvPr>
+          <p:cNvSpPr>
+            <a:spLocks noGrp="1"/>
+          </p:cNvSpPr>
+          <p:nvPr>
+            <p:ph type="title"/>
+          </p:nvPr>
+        </p:nvSpPr>
+        <p:spPr>
+          <a:xfrm>
+            <a:off x="360000" y="1170000"/>
+            <a:ext cx="4314008" cy="994172"/>
+          </a:xfrm>
+        </p:spPr>
+        <p:txBody>
+          <a:bodyPr>
+            <a:normAutofit/>
+          </a:bodyPr>
+          <a:lstStyle/>
+          <a:p>
+            <a:r>
+              <a:rPr lang="ru-RU" sz="2700" b="1" u="sng" dirty="0"/>
+              <a:t>Обобщение текста</a:t>
+            </a:r>
+          </a:p>
+        </p:txBody>
+      </p:sp>
+      <p:sp>
+        <p:nvSpPr>
+          <p:cNvPr id="4" name="Объект 3">
+            <a:extLst>
+              <a:ext uri="{FF2B5EF4-FFF2-40B4-BE49-F238E27FC236}">
+                <a16:creationId xmlns:a16="http://schemas.microsoft.com/office/drawing/2014/main" id="{6FE20B52-975D-25F3-3BC2-29E51C3A9E13}"/>
+              </a:ext>
+            </a:extLst>
+          </p:cNvPr>
+          <p:cNvSpPr>
+            <a:spLocks noGrp="1"/>
+          </p:cNvSpPr>
+          <p:nvPr>
+            <p:ph sz="half" idx="1"/>
+          </p:nvPr>
+        </p:nvSpPr>
+        <p:spPr>
+          <a:xfrm>
+            <a:off x="360000" y="2272937"/>
+            <a:ext cx="4634048" cy="3964577"/>
+          </a:xfrm>
+        </p:spPr>
+        <p:txBody>
+          <a:bodyPr>
+            <a:normAutofit lnSpcReduction="10000"/>
+          </a:bodyPr>
+          <a:lstStyle/>
+          <a:p>
+            <a:pPr marL="385763" indent="-385763">
+              <a:lnSpc>
+                <a:spcPct val="150000"/>
+              </a:lnSpc>
+              <a:buFont typeface="+mj-lt"/>
+              <a:buAutoNum type="arabicPeriod"/>
+            </a:pPr>
+            <a:r>
+              <a:rPr lang="ru-RU" dirty="0">
+                <a:latin typeface="Times New Roman" panose="02020603050405020304" pitchFamily="18" charset="0"/>
+                <a:cs typeface="Times New Roman" panose="02020603050405020304" pitchFamily="18" charset="0"/>
+              </a:rPr>
+              <a:t>Выборка и обработка выделенного пользователем текста.</a:t>
+            </a:r>
+          </a:p>
+          <a:p>
+            <a:pPr marL="385763" indent="-385763">
+              <a:lnSpc>
+                <a:spcPct val="150000"/>
+              </a:lnSpc>
+              <a:buFont typeface="+mj-lt"/>
+              <a:buAutoNum type="arabicPeriod"/>
+            </a:pPr>
+            <a:r>
+              <a:rPr lang="ru-RU" dirty="0">
+                <a:latin typeface="Times New Roman" panose="02020603050405020304" pitchFamily="18" charset="0"/>
+                <a:cs typeface="Times New Roman" panose="02020603050405020304" pitchFamily="18" charset="0"/>
+              </a:rPr>
+              <a:t>Передача серверу текста.</a:t>
+            </a:r>
+          </a:p>
+          <a:p>
+            <a:pPr marL="385763" indent="-385763">
+              <a:lnSpc>
+                <a:spcPct val="150000"/>
+              </a:lnSpc>
+              <a:buFont typeface="+mj-lt"/>
+              <a:buAutoNum type="arabicPeriod"/>
+            </a:pPr>
+            <a:r>
+              <a:rPr lang="ru-RU" dirty="0">
+                <a:latin typeface="Times New Roman" panose="02020603050405020304" pitchFamily="18" charset="0"/>
+                <a:cs typeface="Times New Roman" panose="02020603050405020304" pitchFamily="18" charset="0"/>
+              </a:rPr>
+              <a:t>Сервер формирует запрос.</a:t>
+            </a:r>
+          </a:p>
+          <a:p>
+            <a:pPr marL="385763" indent="-385763">
+              <a:lnSpc>
+                <a:spcPct val="150000"/>
+              </a:lnSpc>
+              <a:buFont typeface="+mj-lt"/>
+              <a:buAutoNum type="arabicPeriod"/>
+            </a:pPr>
+            <a:r>
+              <a:rPr lang="ru-RU" dirty="0">
+                <a:latin typeface="Times New Roman" panose="02020603050405020304" pitchFamily="18" charset="0"/>
+                <a:cs typeface="Times New Roman" panose="02020603050405020304" pitchFamily="18" charset="0"/>
+              </a:rPr>
+              <a:t>Отправка</a:t>
+            </a:r>
+            <a:r>
+              <a:rPr lang="en-US" dirty="0">
+                <a:latin typeface="Times New Roman" panose="02020603050405020304" pitchFamily="18" charset="0"/>
+                <a:cs typeface="Times New Roman" panose="02020603050405020304" pitchFamily="18" charset="0"/>
+              </a:rPr>
+              <a:t> </a:t>
+            </a:r>
+            <a:r>
+              <a:rPr lang="ru-RU" dirty="0">
+                <a:latin typeface="Times New Roman" panose="02020603050405020304" pitchFamily="18" charset="0"/>
+                <a:cs typeface="Times New Roman" panose="02020603050405020304" pitchFamily="18" charset="0"/>
+              </a:rPr>
+              <a:t>запроса к </a:t>
+            </a:r>
+            <a:r>
+              <a:rPr lang="en-US" dirty="0">
+                <a:latin typeface="Times New Roman" panose="02020603050405020304" pitchFamily="18" charset="0"/>
+                <a:cs typeface="Times New Roman" panose="02020603050405020304" pitchFamily="18" charset="0"/>
+              </a:rPr>
+              <a:t>API </a:t>
+            </a:r>
+            <a:r>
+              <a:rPr lang="ru-RU" dirty="0">
+                <a:latin typeface="Times New Roman" panose="02020603050405020304" pitchFamily="18" charset="0"/>
+                <a:cs typeface="Times New Roman" panose="02020603050405020304" pitchFamily="18" charset="0"/>
+              </a:rPr>
+              <a:t>ИИ</a:t>
+            </a:r>
+            <a:r>
+              <a:rPr lang="en-US" dirty="0">
+                <a:latin typeface="Times New Roman" panose="02020603050405020304" pitchFamily="18" charset="0"/>
+                <a:cs typeface="Times New Roman" panose="02020603050405020304" pitchFamily="18" charset="0"/>
+              </a:rPr>
+              <a:t>.</a:t>
+            </a:r>
+            <a:endParaRPr lang="ru-RU" dirty="0">
+              <a:latin typeface="Times New Roman" panose="02020603050405020304" pitchFamily="18" charset="0"/>
+              <a:cs typeface="Times New Roman" panose="02020603050405020304" pitchFamily="18" charset="0"/>
+            </a:endParaRPr>
+          </a:p>
+          <a:p>
+            <a:pPr marL="385763" indent="-385763">
+              <a:lnSpc>
+                <a:spcPct val="150000"/>
+              </a:lnSpc>
+              <a:buFont typeface="+mj-lt"/>
+              <a:buAutoNum type="arabicPeriod"/>
+            </a:pPr>
+            <a:r>
+              <a:rPr lang="ru-RU" dirty="0">
+                <a:latin typeface="Times New Roman" panose="02020603050405020304" pitchFamily="18" charset="0"/>
+                <a:cs typeface="Times New Roman" panose="02020603050405020304" pitchFamily="18" charset="0"/>
+              </a:rPr>
+              <a:t>Получение и обработка ответа сервером.</a:t>
+            </a:r>
+          </a:p>
+          <a:p>
+            <a:pPr marL="385763" indent="-385763">
+              <a:lnSpc>
+                <a:spcPct val="150000"/>
+              </a:lnSpc>
+              <a:buFont typeface="+mj-lt"/>
+              <a:buAutoNum type="arabicPeriod"/>
+            </a:pPr>
+            <a:r>
+              <a:rPr lang="ru-RU" dirty="0">
+                <a:latin typeface="Times New Roman" panose="02020603050405020304" pitchFamily="18" charset="0"/>
+                <a:cs typeface="Times New Roman" panose="02020603050405020304" pitchFamily="18" charset="0"/>
+              </a:rPr>
+              <a:t>Передача клиенту результата</a:t>
+            </a:r>
+            <a:r>
+              <a:rPr lang="en-US" dirty="0">
+                <a:latin typeface="Times New Roman" panose="02020603050405020304" pitchFamily="18" charset="0"/>
+                <a:cs typeface="Times New Roman" panose="02020603050405020304" pitchFamily="18" charset="0"/>
+              </a:rPr>
+              <a:t>.</a:t>
+            </a:r>
+          </a:p>
+          <a:p>
+            <a:pPr marL="0" indent="0">
+              <a:buNone/>
+            </a:pPr>
+            <a:endParaRPr lang="ru-RU" sz="1600" dirty="0"/>
+          </a:p>
+        </p:txBody>
+      </p:sp>
+      <p:pic>
+        <p:nvPicPr>
+          <p:cNvPr id="8" name="Объект 7">
+            <a:extLst>
+              <a:ext uri="{FF2B5EF4-FFF2-40B4-BE49-F238E27FC236}">
+                <a16:creationId xmlns:a16="http://schemas.microsoft.com/office/drawing/2014/main" id="{060442F5-D4C6-20AC-D7F6-57897710893C}"/>
+              </a:ext>
+            </a:extLst>
+          </p:cNvPr>
+          <p:cNvPicPr>
+            <a:picLocks noChangeAspect="1"/>
+          </p:cNvPicPr>
+          <p:nvPr/>
+        </p:nvPicPr>
+        <p:blipFill>
+          <a:blip r:embed="rId2">
+            <a:extLst>
+              <a:ext uri="{28A0092B-C50C-407E-A947-70E740481C1C}">
+                <a14:useLocalDpi xmlns:a14="http://schemas.microsoft.com/office/drawing/2010/main" val="0"/>
+              </a:ext>
+            </a:extLst>
+          </a:blip>
+          <a:stretch>
+            <a:fillRect/>
+          </a:stretch>
+        </p:blipFill>
+        <p:spPr>
+          <a:xfrm>
+            <a:off x="5083083" y="1892606"/>
+            <a:ext cx="2482298" cy="2000125"/>
+          </a:xfrm>
+          <a:prstGeom prst="rect">
+            <a:avLst/>
+          </a:prstGeom>
+          <a:effectLst>
+            <a:outerShdw blurRad="50800" dist="38100" dir="2700000" algn="tl" rotWithShape="0">
+              <a:prstClr val="black">
+                <a:alpha val="40000"/>
+              </a:prstClr>
+            </a:outerShdw>
+          </a:effectLst>
+        </p:spPr>
+      </p:pic>
+      <p:pic>
+        <p:nvPicPr>
+          <p:cNvPr id="10" name="Рисунок 9">
+            <a:extLst>
+              <a:ext uri="{FF2B5EF4-FFF2-40B4-BE49-F238E27FC236}">
+                <a16:creationId xmlns:a16="http://schemas.microsoft.com/office/drawing/2014/main" id="{39737559-F0E6-9995-AA97-21BC0D895615}"/>
+              </a:ext>
+            </a:extLst>
+          </p:cNvPr>
+          <p:cNvPicPr>
+            <a:picLocks noChangeAspect="1"/>
+          </p:cNvPicPr>
+          <p:nvPr/>
+        </p:nvPicPr>
+        <p:blipFill>
+          <a:blip r:embed="rId3"/>
+          <a:stretch>
+            <a:fillRect/>
+          </a:stretch>
+        </p:blipFill>
+        <p:spPr>
+          <a:xfrm>
+            <a:off x="5403123" y="3827419"/>
+            <a:ext cx="3211482" cy="1952897"/>
+          </a:xfrm>
+          <a:prstGeom prst="rect">
+            <a:avLst/>
+          </a:prstGeom>
+          <a:effectLst>
+            <a:outerShdw blurRad="50800" dist="38100" dir="2700000" algn="tl" rotWithShape="0">
+              <a:prstClr val="black">
+                <a:alpha val="40000"/>
+              </a:prstClr>
+            </a:outerShdw>
+          </a:effectLst>
+        </p:spPr>
+      </p:pic>
+    </p:spTree>
+    <p:extLst>
+      <p:ext uri="{BB962C8B-B14F-4D97-AF65-F5344CB8AC3E}">
+        <p14:creationId xmlns:p14="http://schemas.microsoft.com/office/powerpoint/2010/main" val="3592267970"/>
       </p:ext>
     </p:extLst>
   </p:cSld>

</xml_diff>